<commit_message>
added probably wrong answer to 6 and started working on minimax
</commit_message>
<xml_diff>
--- a/hw2-examples.pptx
+++ b/hw2-examples.pptx
@@ -12,8 +12,8 @@
     <p:sldId id="260" r:id="rId6"/>
     <p:sldId id="261" r:id="rId7"/>
     <p:sldId id="262" r:id="rId8"/>
-    <p:sldId id="263" r:id="rId9"/>
-    <p:sldId id="264" r:id="rId10"/>
+    <p:sldId id="264" r:id="rId9"/>
+    <p:sldId id="263" r:id="rId10"/>
   </p:sldIdLst>
   <p:sldSz cx="12192000" cy="6858000"/>
   <p:notesSz cx="6858000" cy="9144000"/>
@@ -269,7 +269,7 @@
           <a:p>
             <a:fld id="{609C88DF-570F-4829-B751-3E93E7A10B2F}" type="datetimeFigureOut">
               <a:rPr lang="he-IL" smtClean="0"/>
-              <a:t>כ"ג/טבת/תשפ"ב</a:t>
+              <a:t>כ"ד/טבת/תשפ"ב</a:t>
             </a:fld>
             <a:endParaRPr lang="he-IL"/>
           </a:p>
@@ -469,7 +469,7 @@
           <a:p>
             <a:fld id="{609C88DF-570F-4829-B751-3E93E7A10B2F}" type="datetimeFigureOut">
               <a:rPr lang="he-IL" smtClean="0"/>
-              <a:t>כ"ג/טבת/תשפ"ב</a:t>
+              <a:t>כ"ד/טבת/תשפ"ב</a:t>
             </a:fld>
             <a:endParaRPr lang="he-IL"/>
           </a:p>
@@ -679,7 +679,7 @@
           <a:p>
             <a:fld id="{609C88DF-570F-4829-B751-3E93E7A10B2F}" type="datetimeFigureOut">
               <a:rPr lang="he-IL" smtClean="0"/>
-              <a:t>כ"ג/טבת/תשפ"ב</a:t>
+              <a:t>כ"ד/טבת/תשפ"ב</a:t>
             </a:fld>
             <a:endParaRPr lang="he-IL"/>
           </a:p>
@@ -879,7 +879,7 @@
           <a:p>
             <a:fld id="{609C88DF-570F-4829-B751-3E93E7A10B2F}" type="datetimeFigureOut">
               <a:rPr lang="he-IL" smtClean="0"/>
-              <a:t>כ"ג/טבת/תשפ"ב</a:t>
+              <a:t>כ"ד/טבת/תשפ"ב</a:t>
             </a:fld>
             <a:endParaRPr lang="he-IL"/>
           </a:p>
@@ -1155,7 +1155,7 @@
           <a:p>
             <a:fld id="{609C88DF-570F-4829-B751-3E93E7A10B2F}" type="datetimeFigureOut">
               <a:rPr lang="he-IL" smtClean="0"/>
-              <a:t>כ"ג/טבת/תשפ"ב</a:t>
+              <a:t>כ"ד/טבת/תשפ"ב</a:t>
             </a:fld>
             <a:endParaRPr lang="he-IL"/>
           </a:p>
@@ -1423,7 +1423,7 @@
           <a:p>
             <a:fld id="{609C88DF-570F-4829-B751-3E93E7A10B2F}" type="datetimeFigureOut">
               <a:rPr lang="he-IL" smtClean="0"/>
-              <a:t>כ"ג/טבת/תשפ"ב</a:t>
+              <a:t>כ"ד/טבת/תשפ"ב</a:t>
             </a:fld>
             <a:endParaRPr lang="he-IL"/>
           </a:p>
@@ -1838,7 +1838,7 @@
           <a:p>
             <a:fld id="{609C88DF-570F-4829-B751-3E93E7A10B2F}" type="datetimeFigureOut">
               <a:rPr lang="he-IL" smtClean="0"/>
-              <a:t>כ"ג/טבת/תשפ"ב</a:t>
+              <a:t>כ"ד/טבת/תשפ"ב</a:t>
             </a:fld>
             <a:endParaRPr lang="he-IL"/>
           </a:p>
@@ -1980,7 +1980,7 @@
           <a:p>
             <a:fld id="{609C88DF-570F-4829-B751-3E93E7A10B2F}" type="datetimeFigureOut">
               <a:rPr lang="he-IL" smtClean="0"/>
-              <a:t>כ"ג/טבת/תשפ"ב</a:t>
+              <a:t>כ"ד/טבת/תשפ"ב</a:t>
             </a:fld>
             <a:endParaRPr lang="he-IL"/>
           </a:p>
@@ -2093,7 +2093,7 @@
           <a:p>
             <a:fld id="{609C88DF-570F-4829-B751-3E93E7A10B2F}" type="datetimeFigureOut">
               <a:rPr lang="he-IL" smtClean="0"/>
-              <a:t>כ"ג/טבת/תשפ"ב</a:t>
+              <a:t>כ"ד/טבת/תשפ"ב</a:t>
             </a:fld>
             <a:endParaRPr lang="he-IL"/>
           </a:p>
@@ -2406,7 +2406,7 @@
           <a:p>
             <a:fld id="{609C88DF-570F-4829-B751-3E93E7A10B2F}" type="datetimeFigureOut">
               <a:rPr lang="he-IL" smtClean="0"/>
-              <a:t>כ"ג/טבת/תשפ"ב</a:t>
+              <a:t>כ"ד/טבת/תשפ"ב</a:t>
             </a:fld>
             <a:endParaRPr lang="he-IL"/>
           </a:p>
@@ -2695,7 +2695,7 @@
           <a:p>
             <a:fld id="{609C88DF-570F-4829-B751-3E93E7A10B2F}" type="datetimeFigureOut">
               <a:rPr lang="he-IL" smtClean="0"/>
-              <a:t>כ"ג/טבת/תשפ"ב</a:t>
+              <a:t>כ"ד/טבת/תשפ"ב</a:t>
             </a:fld>
             <a:endParaRPr lang="he-IL"/>
           </a:p>
@@ -2938,7 +2938,7 @@
           <a:p>
             <a:fld id="{609C88DF-570F-4829-B751-3E93E7A10B2F}" type="datetimeFigureOut">
               <a:rPr lang="he-IL" smtClean="0"/>
-              <a:t>כ"ג/טבת/תשפ"ב</a:t>
+              <a:t>כ"ד/טבת/תשפ"ב</a:t>
             </a:fld>
             <a:endParaRPr lang="he-IL"/>
           </a:p>
@@ -20591,8 +20591,8 @@
             </a:fontRef>
           </p:style>
         </p:cxnSp>
-        <mc:AlternateContent xmlns:mc="http://schemas.openxmlformats.org/markup-compatibility/2006">
-          <mc:Choice xmlns:a14="http://schemas.microsoft.com/office/drawing/2010/main" Requires="a14">
+        <mc:AlternateContent xmlns:mc="http://schemas.openxmlformats.org/markup-compatibility/2006" xmlns:a14="http://schemas.microsoft.com/office/drawing/2010/main">
+          <mc:Choice Requires="a14">
             <p:sp>
               <p:nvSpPr>
                 <p:cNvPr id="74" name="TextBox 73">
@@ -20669,13 +20669,7 @@
                           <a:rPr lang="en-US" b="0" i="1" smtClean="0">
                             <a:latin typeface="Cambria Math" panose="02040503050406030204" pitchFamily="18" charset="0"/>
                           </a:rPr>
-                          <m:t>)</m:t>
-                        </m:r>
-                        <m:r>
-                          <a:rPr lang="en-US" b="0" i="1" smtClean="0">
-                            <a:latin typeface="Cambria Math" panose="02040503050406030204" pitchFamily="18" charset="0"/>
-                          </a:rPr>
-                          <m:t>=</m:t>
+                          <m:t>)=</m:t>
                         </m:r>
                         <m:r>
                           <a:rPr lang="en-US" b="0" i="1" smtClean="0">
@@ -20691,7 +20685,7 @@
               </p:txBody>
             </p:sp>
           </mc:Choice>
-          <mc:Fallback>
+          <mc:Fallback xmlns="">
             <p:sp>
               <p:nvSpPr>
                 <p:cNvPr id="74" name="TextBox 73">
@@ -20736,8 +20730,8 @@
             </p:sp>
           </mc:Fallback>
         </mc:AlternateContent>
-        <mc:AlternateContent xmlns:mc="http://schemas.openxmlformats.org/markup-compatibility/2006">
-          <mc:Choice xmlns:a14="http://schemas.microsoft.com/office/drawing/2010/main" Requires="a14">
+        <mc:AlternateContent xmlns:mc="http://schemas.openxmlformats.org/markup-compatibility/2006" xmlns:a14="http://schemas.microsoft.com/office/drawing/2010/main">
+          <mc:Choice Requires="a14">
             <p:sp>
               <p:nvSpPr>
                 <p:cNvPr id="75" name="TextBox 74">
@@ -20814,13 +20808,7 @@
                           <a:rPr lang="en-US" b="0" i="1" smtClean="0">
                             <a:latin typeface="Cambria Math" panose="02040503050406030204" pitchFamily="18" charset="0"/>
                           </a:rPr>
-                          <m:t>)</m:t>
-                        </m:r>
-                        <m:r>
-                          <a:rPr lang="en-US" b="0" i="1" smtClean="0">
-                            <a:latin typeface="Cambria Math" panose="02040503050406030204" pitchFamily="18" charset="0"/>
-                          </a:rPr>
-                          <m:t>=</m:t>
+                          <m:t>)=</m:t>
                         </m:r>
                         <m:r>
                           <a:rPr lang="en-US" b="0" i="1" smtClean="0">
@@ -20836,7 +20824,7 @@
               </p:txBody>
             </p:sp>
           </mc:Choice>
-          <mc:Fallback>
+          <mc:Fallback xmlns="">
             <p:sp>
               <p:nvSpPr>
                 <p:cNvPr id="75" name="TextBox 74">
@@ -20881,8 +20869,8 @@
             </p:sp>
           </mc:Fallback>
         </mc:AlternateContent>
-        <mc:AlternateContent xmlns:mc="http://schemas.openxmlformats.org/markup-compatibility/2006">
-          <mc:Choice xmlns:a14="http://schemas.microsoft.com/office/drawing/2010/main" Requires="a14">
+        <mc:AlternateContent xmlns:mc="http://schemas.openxmlformats.org/markup-compatibility/2006" xmlns:a14="http://schemas.microsoft.com/office/drawing/2010/main">
+          <mc:Choice Requires="a14">
             <p:sp>
               <p:nvSpPr>
                 <p:cNvPr id="76" name="TextBox 75">
@@ -20959,13 +20947,7 @@
                           <a:rPr lang="en-US" b="0" i="1" smtClean="0">
                             <a:latin typeface="Cambria Math" panose="02040503050406030204" pitchFamily="18" charset="0"/>
                           </a:rPr>
-                          <m:t>)</m:t>
-                        </m:r>
-                        <m:r>
-                          <a:rPr lang="en-US" b="0" i="1" smtClean="0">
-                            <a:latin typeface="Cambria Math" panose="02040503050406030204" pitchFamily="18" charset="0"/>
-                          </a:rPr>
-                          <m:t>=</m:t>
+                          <m:t>)=</m:t>
                         </m:r>
                         <m:r>
                           <a:rPr lang="en-US" b="0" i="1" smtClean="0">
@@ -20981,7 +20963,7 @@
               </p:txBody>
             </p:sp>
           </mc:Choice>
-          <mc:Fallback>
+          <mc:Fallback xmlns="">
             <p:sp>
               <p:nvSpPr>
                 <p:cNvPr id="76" name="TextBox 75">
@@ -21026,8 +21008,8 @@
             </p:sp>
           </mc:Fallback>
         </mc:AlternateContent>
-        <mc:AlternateContent xmlns:mc="http://schemas.openxmlformats.org/markup-compatibility/2006">
-          <mc:Choice xmlns:a14="http://schemas.microsoft.com/office/drawing/2010/main" Requires="a14">
+        <mc:AlternateContent xmlns:mc="http://schemas.openxmlformats.org/markup-compatibility/2006" xmlns:a14="http://schemas.microsoft.com/office/drawing/2010/main">
+          <mc:Choice Requires="a14">
             <p:sp>
               <p:nvSpPr>
                 <p:cNvPr id="77" name="TextBox 76">
@@ -21104,13 +21086,7 @@
                           <a:rPr lang="en-US" b="0" i="1" smtClean="0">
                             <a:latin typeface="Cambria Math" panose="02040503050406030204" pitchFamily="18" charset="0"/>
                           </a:rPr>
-                          <m:t>)</m:t>
-                        </m:r>
-                        <m:r>
-                          <a:rPr lang="en-US" b="0" i="1" smtClean="0">
-                            <a:latin typeface="Cambria Math" panose="02040503050406030204" pitchFamily="18" charset="0"/>
-                          </a:rPr>
-                          <m:t>=</m:t>
+                          <m:t>)=</m:t>
                         </m:r>
                         <m:r>
                           <a:rPr lang="en-US" b="0" i="1" smtClean="0">
@@ -21126,7 +21102,7 @@
               </p:txBody>
             </p:sp>
           </mc:Choice>
-          <mc:Fallback>
+          <mc:Fallback xmlns="">
             <p:sp>
               <p:nvSpPr>
                 <p:cNvPr id="77" name="TextBox 76">
@@ -21456,8 +21432,8 @@
             </a:p>
           </p:txBody>
         </p:sp>
-        <mc:AlternateContent xmlns:mc="http://schemas.openxmlformats.org/markup-compatibility/2006">
-          <mc:Choice xmlns:a14="http://schemas.microsoft.com/office/drawing/2010/main" Requires="a14">
+        <mc:AlternateContent xmlns:mc="http://schemas.openxmlformats.org/markup-compatibility/2006" xmlns:a14="http://schemas.microsoft.com/office/drawing/2010/main">
+          <mc:Choice Requires="a14">
             <p:sp>
               <p:nvSpPr>
                 <p:cNvPr id="30" name="TextBox 29">
@@ -21519,7 +21495,7 @@
               </p:txBody>
             </p:sp>
           </mc:Choice>
-          <mc:Fallback>
+          <mc:Fallback xmlns="">
             <p:sp>
               <p:nvSpPr>
                 <p:cNvPr id="30" name="TextBox 29">
@@ -21564,8 +21540,8 @@
             </p:sp>
           </mc:Fallback>
         </mc:AlternateContent>
-        <mc:AlternateContent xmlns:mc="http://schemas.openxmlformats.org/markup-compatibility/2006">
-          <mc:Choice xmlns:a14="http://schemas.microsoft.com/office/drawing/2010/main" Requires="a14">
+        <mc:AlternateContent xmlns:mc="http://schemas.openxmlformats.org/markup-compatibility/2006" xmlns:a14="http://schemas.microsoft.com/office/drawing/2010/main">
+          <mc:Choice Requires="a14">
             <p:sp>
               <p:nvSpPr>
                 <p:cNvPr id="31" name="TextBox 30">
@@ -21627,7 +21603,7 @@
               </p:txBody>
             </p:sp>
           </mc:Choice>
-          <mc:Fallback>
+          <mc:Fallback xmlns="">
             <p:sp>
               <p:nvSpPr>
                 <p:cNvPr id="31" name="TextBox 30">
@@ -21672,8 +21648,8 @@
             </p:sp>
           </mc:Fallback>
         </mc:AlternateContent>
-        <mc:AlternateContent xmlns:mc="http://schemas.openxmlformats.org/markup-compatibility/2006">
-          <mc:Choice xmlns:a14="http://schemas.microsoft.com/office/drawing/2010/main" Requires="a14">
+        <mc:AlternateContent xmlns:mc="http://schemas.openxmlformats.org/markup-compatibility/2006" xmlns:a14="http://schemas.microsoft.com/office/drawing/2010/main">
+          <mc:Choice Requires="a14">
             <p:sp>
               <p:nvSpPr>
                 <p:cNvPr id="32" name="TextBox 31">
@@ -21735,7 +21711,7 @@
               </p:txBody>
             </p:sp>
           </mc:Choice>
-          <mc:Fallback>
+          <mc:Fallback xmlns="">
             <p:sp>
               <p:nvSpPr>
                 <p:cNvPr id="32" name="TextBox 31">
@@ -21813,1675 +21789,6 @@
       </p:grpSpPr>
       <p:grpSp>
         <p:nvGrpSpPr>
-          <p:cNvPr id="4" name="Group 3">
-            <a:extLst>
-              <a:ext uri="{FF2B5EF4-FFF2-40B4-BE49-F238E27FC236}">
-                <a16:creationId xmlns:a16="http://schemas.microsoft.com/office/drawing/2014/main" id="{4E259920-68B2-4FE5-8D99-280957EAD6C8}"/>
-              </a:ext>
-            </a:extLst>
-          </p:cNvPr>
-          <p:cNvGrpSpPr/>
-          <p:nvPr/>
-        </p:nvGrpSpPr>
-        <p:grpSpPr>
-          <a:xfrm>
-            <a:off x="2892859" y="696313"/>
-            <a:ext cx="7790765" cy="3647831"/>
-            <a:chOff x="2892859" y="696313"/>
-            <a:chExt cx="7790765" cy="3647831"/>
-          </a:xfrm>
-        </p:grpSpPr>
-        <p:sp>
-          <p:nvSpPr>
-            <p:cNvPr id="2" name="Isosceles Triangle 1">
-              <a:extLst>
-                <a:ext uri="{FF2B5EF4-FFF2-40B4-BE49-F238E27FC236}">
-                  <a16:creationId xmlns:a16="http://schemas.microsoft.com/office/drawing/2014/main" id="{6A11F797-F563-4CDE-8C3F-0450B16EF178}"/>
-                </a:ext>
-              </a:extLst>
-            </p:cNvPr>
-            <p:cNvSpPr/>
-            <p:nvPr/>
-          </p:nvSpPr>
-          <p:spPr>
-            <a:xfrm>
-              <a:off x="5587738" y="754144"/>
-              <a:ext cx="685800" cy="548640"/>
-            </a:xfrm>
-            <a:prstGeom prst="triangle">
-              <a:avLst/>
-            </a:prstGeom>
-            <a:solidFill>
-              <a:srgbClr val="0070C0"/>
-            </a:solidFill>
-            <a:ln w="25400">
-              <a:solidFill>
-                <a:schemeClr val="tx1"/>
-              </a:solidFill>
-            </a:ln>
-          </p:spPr>
-          <p:style>
-            <a:lnRef idx="2">
-              <a:schemeClr val="accent1">
-                <a:shade val="50000"/>
-              </a:schemeClr>
-            </a:lnRef>
-            <a:fillRef idx="1">
-              <a:schemeClr val="accent1"/>
-            </a:fillRef>
-            <a:effectRef idx="0">
-              <a:schemeClr val="accent1"/>
-            </a:effectRef>
-            <a:fontRef idx="minor">
-              <a:schemeClr val="lt1"/>
-            </a:fontRef>
-          </p:style>
-          <p:txBody>
-            <a:bodyPr rtlCol="1" anchor="ctr"/>
-            <a:lstStyle/>
-            <a:p>
-              <a:pPr algn="ctr"/>
-              <a:endParaRPr lang="he-IL"/>
-            </a:p>
-          </p:txBody>
-        </p:sp>
-        <p:sp>
-          <p:nvSpPr>
-            <p:cNvPr id="45" name="Isosceles Triangle 44">
-              <a:extLst>
-                <a:ext uri="{FF2B5EF4-FFF2-40B4-BE49-F238E27FC236}">
-                  <a16:creationId xmlns:a16="http://schemas.microsoft.com/office/drawing/2014/main" id="{7B38CEDB-81AE-4059-9326-93F8EBF308A6}"/>
-                </a:ext>
-              </a:extLst>
-            </p:cNvPr>
-            <p:cNvSpPr/>
-            <p:nvPr/>
-          </p:nvSpPr>
-          <p:spPr>
-            <a:xfrm rot="10800000">
-              <a:off x="4130697" y="1915213"/>
-              <a:ext cx="685800" cy="548640"/>
-            </a:xfrm>
-            <a:prstGeom prst="triangle">
-              <a:avLst/>
-            </a:prstGeom>
-            <a:solidFill>
-              <a:srgbClr val="FF0000"/>
-            </a:solidFill>
-            <a:ln w="25400">
-              <a:solidFill>
-                <a:schemeClr val="tx1"/>
-              </a:solidFill>
-            </a:ln>
-          </p:spPr>
-          <p:style>
-            <a:lnRef idx="2">
-              <a:schemeClr val="accent1">
-                <a:shade val="50000"/>
-              </a:schemeClr>
-            </a:lnRef>
-            <a:fillRef idx="1">
-              <a:schemeClr val="accent1"/>
-            </a:fillRef>
-            <a:effectRef idx="0">
-              <a:schemeClr val="accent1"/>
-            </a:effectRef>
-            <a:fontRef idx="minor">
-              <a:schemeClr val="lt1"/>
-            </a:fontRef>
-          </p:style>
-          <p:txBody>
-            <a:bodyPr rtlCol="1" anchor="ctr"/>
-            <a:lstStyle/>
-            <a:p>
-              <a:pPr algn="ctr"/>
-              <a:endParaRPr lang="he-IL"/>
-            </a:p>
-          </p:txBody>
-        </p:sp>
-        <p:sp>
-          <p:nvSpPr>
-            <p:cNvPr id="3" name="Rectangle 2">
-              <a:extLst>
-                <a:ext uri="{FF2B5EF4-FFF2-40B4-BE49-F238E27FC236}">
-                  <a16:creationId xmlns:a16="http://schemas.microsoft.com/office/drawing/2014/main" id="{38E38ED5-1B4D-417C-AA79-86E162D86376}"/>
-                </a:ext>
-              </a:extLst>
-            </p:cNvPr>
-            <p:cNvSpPr/>
-            <p:nvPr/>
-          </p:nvSpPr>
-          <p:spPr>
-            <a:xfrm>
-              <a:off x="3276052" y="3210268"/>
-              <a:ext cx="685800" cy="685800"/>
-            </a:xfrm>
-            <a:prstGeom prst="rect">
-              <a:avLst/>
-            </a:prstGeom>
-            <a:ln w="25400">
-              <a:solidFill>
-                <a:schemeClr val="tx1"/>
-              </a:solidFill>
-            </a:ln>
-          </p:spPr>
-          <p:style>
-            <a:lnRef idx="2">
-              <a:schemeClr val="accent1">
-                <a:shade val="50000"/>
-              </a:schemeClr>
-            </a:lnRef>
-            <a:fillRef idx="1">
-              <a:schemeClr val="accent1"/>
-            </a:fillRef>
-            <a:effectRef idx="0">
-              <a:schemeClr val="accent1"/>
-            </a:effectRef>
-            <a:fontRef idx="minor">
-              <a:schemeClr val="lt1"/>
-            </a:fontRef>
-          </p:style>
-          <p:txBody>
-            <a:bodyPr rtlCol="1" anchor="ctr"/>
-            <a:lstStyle/>
-            <a:p>
-              <a:pPr algn="ctr"/>
-              <a:endParaRPr lang="he-IL"/>
-            </a:p>
-          </p:txBody>
-        </p:sp>
-        <p:sp>
-          <p:nvSpPr>
-            <p:cNvPr id="48" name="Rectangle 47">
-              <a:extLst>
-                <a:ext uri="{FF2B5EF4-FFF2-40B4-BE49-F238E27FC236}">
-                  <a16:creationId xmlns:a16="http://schemas.microsoft.com/office/drawing/2014/main" id="{01A7C47E-586D-4C7B-8C6C-A2CEA0A6D830}"/>
-                </a:ext>
-              </a:extLst>
-            </p:cNvPr>
-            <p:cNvSpPr/>
-            <p:nvPr/>
-          </p:nvSpPr>
-          <p:spPr>
-            <a:xfrm>
-              <a:off x="4901938" y="3210268"/>
-              <a:ext cx="685800" cy="685800"/>
-            </a:xfrm>
-            <a:prstGeom prst="rect">
-              <a:avLst/>
-            </a:prstGeom>
-            <a:ln w="25400">
-              <a:solidFill>
-                <a:schemeClr val="tx1"/>
-              </a:solidFill>
-            </a:ln>
-          </p:spPr>
-          <p:style>
-            <a:lnRef idx="2">
-              <a:schemeClr val="accent1">
-                <a:shade val="50000"/>
-              </a:schemeClr>
-            </a:lnRef>
-            <a:fillRef idx="1">
-              <a:schemeClr val="accent1"/>
-            </a:fillRef>
-            <a:effectRef idx="0">
-              <a:schemeClr val="accent1"/>
-            </a:effectRef>
-            <a:fontRef idx="minor">
-              <a:schemeClr val="lt1"/>
-            </a:fontRef>
-          </p:style>
-          <p:txBody>
-            <a:bodyPr rtlCol="1" anchor="ctr"/>
-            <a:lstStyle/>
-            <a:p>
-              <a:pPr algn="ctr"/>
-              <a:endParaRPr lang="he-IL"/>
-            </a:p>
-          </p:txBody>
-        </p:sp>
-        <p:sp>
-          <p:nvSpPr>
-            <p:cNvPr id="50" name="Isosceles Triangle 49">
-              <a:extLst>
-                <a:ext uri="{FF2B5EF4-FFF2-40B4-BE49-F238E27FC236}">
-                  <a16:creationId xmlns:a16="http://schemas.microsoft.com/office/drawing/2014/main" id="{44CACD17-EB4B-487B-BF6B-026BCC73B346}"/>
-                </a:ext>
-              </a:extLst>
-            </p:cNvPr>
-            <p:cNvSpPr/>
-            <p:nvPr/>
-          </p:nvSpPr>
-          <p:spPr>
-            <a:xfrm rot="10800000">
-              <a:off x="7128183" y="1915214"/>
-              <a:ext cx="685800" cy="548640"/>
-            </a:xfrm>
-            <a:prstGeom prst="triangle">
-              <a:avLst/>
-            </a:prstGeom>
-            <a:solidFill>
-              <a:srgbClr val="FF0000"/>
-            </a:solidFill>
-            <a:ln w="25400">
-              <a:solidFill>
-                <a:schemeClr val="tx1"/>
-              </a:solidFill>
-            </a:ln>
-          </p:spPr>
-          <p:style>
-            <a:lnRef idx="2">
-              <a:schemeClr val="accent1">
-                <a:shade val="50000"/>
-              </a:schemeClr>
-            </a:lnRef>
-            <a:fillRef idx="1">
-              <a:schemeClr val="accent1"/>
-            </a:fillRef>
-            <a:effectRef idx="0">
-              <a:schemeClr val="accent1"/>
-            </a:effectRef>
-            <a:fontRef idx="minor">
-              <a:schemeClr val="lt1"/>
-            </a:fontRef>
-          </p:style>
-          <p:txBody>
-            <a:bodyPr rtlCol="1" anchor="ctr"/>
-            <a:lstStyle/>
-            <a:p>
-              <a:pPr algn="ctr"/>
-              <a:endParaRPr lang="he-IL"/>
-            </a:p>
-          </p:txBody>
-        </p:sp>
-        <p:sp>
-          <p:nvSpPr>
-            <p:cNvPr id="51" name="Rectangle 50">
-              <a:extLst>
-                <a:ext uri="{FF2B5EF4-FFF2-40B4-BE49-F238E27FC236}">
-                  <a16:creationId xmlns:a16="http://schemas.microsoft.com/office/drawing/2014/main" id="{9C60AA9D-660C-4993-AAF1-591ED97AA247}"/>
-                </a:ext>
-              </a:extLst>
-            </p:cNvPr>
-            <p:cNvSpPr/>
-            <p:nvPr/>
-          </p:nvSpPr>
-          <p:spPr>
-            <a:xfrm>
-              <a:off x="6273538" y="3210269"/>
-              <a:ext cx="685800" cy="685800"/>
-            </a:xfrm>
-            <a:prstGeom prst="rect">
-              <a:avLst/>
-            </a:prstGeom>
-            <a:ln w="25400">
-              <a:solidFill>
-                <a:schemeClr val="tx1"/>
-              </a:solidFill>
-            </a:ln>
-          </p:spPr>
-          <p:style>
-            <a:lnRef idx="2">
-              <a:schemeClr val="accent1">
-                <a:shade val="50000"/>
-              </a:schemeClr>
-            </a:lnRef>
-            <a:fillRef idx="1">
-              <a:schemeClr val="accent1"/>
-            </a:fillRef>
-            <a:effectRef idx="0">
-              <a:schemeClr val="accent1"/>
-            </a:effectRef>
-            <a:fontRef idx="minor">
-              <a:schemeClr val="lt1"/>
-            </a:fontRef>
-          </p:style>
-          <p:txBody>
-            <a:bodyPr rtlCol="1" anchor="ctr"/>
-            <a:lstStyle/>
-            <a:p>
-              <a:pPr algn="ctr"/>
-              <a:endParaRPr lang="he-IL"/>
-            </a:p>
-          </p:txBody>
-        </p:sp>
-        <p:sp>
-          <p:nvSpPr>
-            <p:cNvPr id="52" name="Rectangle 51">
-              <a:extLst>
-                <a:ext uri="{FF2B5EF4-FFF2-40B4-BE49-F238E27FC236}">
-                  <a16:creationId xmlns:a16="http://schemas.microsoft.com/office/drawing/2014/main" id="{333E295C-4C95-4C9A-98EB-A973C6E40A78}"/>
-                </a:ext>
-              </a:extLst>
-            </p:cNvPr>
-            <p:cNvSpPr/>
-            <p:nvPr/>
-          </p:nvSpPr>
-          <p:spPr>
-            <a:xfrm>
-              <a:off x="7899424" y="3210269"/>
-              <a:ext cx="685800" cy="685800"/>
-            </a:xfrm>
-            <a:prstGeom prst="rect">
-              <a:avLst/>
-            </a:prstGeom>
-            <a:ln w="25400">
-              <a:solidFill>
-                <a:schemeClr val="tx1"/>
-              </a:solidFill>
-            </a:ln>
-          </p:spPr>
-          <p:style>
-            <a:lnRef idx="2">
-              <a:schemeClr val="accent1">
-                <a:shade val="50000"/>
-              </a:schemeClr>
-            </a:lnRef>
-            <a:fillRef idx="1">
-              <a:schemeClr val="accent1"/>
-            </a:fillRef>
-            <a:effectRef idx="0">
-              <a:schemeClr val="accent1"/>
-            </a:effectRef>
-            <a:fontRef idx="minor">
-              <a:schemeClr val="lt1"/>
-            </a:fontRef>
-          </p:style>
-          <p:txBody>
-            <a:bodyPr rtlCol="1" anchor="ctr"/>
-            <a:lstStyle/>
-            <a:p>
-              <a:pPr algn="ctr"/>
-              <a:endParaRPr lang="he-IL"/>
-            </a:p>
-          </p:txBody>
-        </p:sp>
-        <p:cxnSp>
-          <p:nvCxnSpPr>
-            <p:cNvPr id="5" name="Straight Connector 4">
-              <a:extLst>
-                <a:ext uri="{FF2B5EF4-FFF2-40B4-BE49-F238E27FC236}">
-                  <a16:creationId xmlns:a16="http://schemas.microsoft.com/office/drawing/2014/main" id="{1925075F-8821-4439-8E38-6B77B1535AB1}"/>
-                </a:ext>
-              </a:extLst>
-            </p:cNvPr>
-            <p:cNvCxnSpPr>
-              <a:stCxn id="2" idx="2"/>
-              <a:endCxn id="45" idx="3"/>
-            </p:cNvCxnSpPr>
-            <p:nvPr/>
-          </p:nvCxnSpPr>
-          <p:spPr>
-            <a:xfrm flipH="1">
-              <a:off x="4473597" y="1302784"/>
-              <a:ext cx="1114141" cy="612429"/>
-            </a:xfrm>
-            <a:prstGeom prst="line">
-              <a:avLst/>
-            </a:prstGeom>
-            <a:ln w="25400">
-              <a:solidFill>
-                <a:schemeClr val="tx1"/>
-              </a:solidFill>
-              <a:tailEnd type="none"/>
-            </a:ln>
-          </p:spPr>
-          <p:style>
-            <a:lnRef idx="1">
-              <a:schemeClr val="accent1"/>
-            </a:lnRef>
-            <a:fillRef idx="0">
-              <a:schemeClr val="accent1"/>
-            </a:fillRef>
-            <a:effectRef idx="0">
-              <a:schemeClr val="accent1"/>
-            </a:effectRef>
-            <a:fontRef idx="minor">
-              <a:schemeClr val="tx1"/>
-            </a:fontRef>
-          </p:style>
-        </p:cxnSp>
-        <p:cxnSp>
-          <p:nvCxnSpPr>
-            <p:cNvPr id="55" name="Straight Connector 54">
-              <a:extLst>
-                <a:ext uri="{FF2B5EF4-FFF2-40B4-BE49-F238E27FC236}">
-                  <a16:creationId xmlns:a16="http://schemas.microsoft.com/office/drawing/2014/main" id="{84A9E243-4E39-4807-BFB4-F7E80E7237F7}"/>
-                </a:ext>
-              </a:extLst>
-            </p:cNvPr>
-            <p:cNvCxnSpPr>
-              <a:cxnSpLocks/>
-              <a:stCxn id="2" idx="4"/>
-              <a:endCxn id="50" idx="3"/>
-            </p:cNvCxnSpPr>
-            <p:nvPr/>
-          </p:nvCxnSpPr>
-          <p:spPr>
-            <a:xfrm>
-              <a:off x="6273538" y="1302784"/>
-              <a:ext cx="1197545" cy="612430"/>
-            </a:xfrm>
-            <a:prstGeom prst="line">
-              <a:avLst/>
-            </a:prstGeom>
-            <a:ln w="25400">
-              <a:solidFill>
-                <a:schemeClr val="tx1"/>
-              </a:solidFill>
-              <a:headEnd type="none"/>
-              <a:tailEnd type="none"/>
-            </a:ln>
-          </p:spPr>
-          <p:style>
-            <a:lnRef idx="1">
-              <a:schemeClr val="accent1"/>
-            </a:lnRef>
-            <a:fillRef idx="0">
-              <a:schemeClr val="accent1"/>
-            </a:fillRef>
-            <a:effectRef idx="0">
-              <a:schemeClr val="accent1"/>
-            </a:effectRef>
-            <a:fontRef idx="minor">
-              <a:schemeClr val="tx1"/>
-            </a:fontRef>
-          </p:style>
-        </p:cxnSp>
-        <p:cxnSp>
-          <p:nvCxnSpPr>
-            <p:cNvPr id="58" name="Straight Connector 57">
-              <a:extLst>
-                <a:ext uri="{FF2B5EF4-FFF2-40B4-BE49-F238E27FC236}">
-                  <a16:creationId xmlns:a16="http://schemas.microsoft.com/office/drawing/2014/main" id="{D8483294-A05D-43E0-BC66-B4A87DAC8315}"/>
-                </a:ext>
-              </a:extLst>
-            </p:cNvPr>
-            <p:cNvCxnSpPr>
-              <a:cxnSpLocks/>
-              <a:stCxn id="3" idx="0"/>
-              <a:endCxn id="45" idx="5"/>
-            </p:cNvCxnSpPr>
-            <p:nvPr/>
-          </p:nvCxnSpPr>
-          <p:spPr>
-            <a:xfrm flipV="1">
-              <a:off x="3618952" y="2189533"/>
-              <a:ext cx="683195" cy="1020735"/>
-            </a:xfrm>
-            <a:prstGeom prst="line">
-              <a:avLst/>
-            </a:prstGeom>
-            <a:ln w="25400">
-              <a:solidFill>
-                <a:schemeClr val="tx1"/>
-              </a:solidFill>
-            </a:ln>
-          </p:spPr>
-          <p:style>
-            <a:lnRef idx="1">
-              <a:schemeClr val="accent1"/>
-            </a:lnRef>
-            <a:fillRef idx="0">
-              <a:schemeClr val="accent1"/>
-            </a:fillRef>
-            <a:effectRef idx="0">
-              <a:schemeClr val="accent1"/>
-            </a:effectRef>
-            <a:fontRef idx="minor">
-              <a:schemeClr val="tx1"/>
-            </a:fontRef>
-          </p:style>
-        </p:cxnSp>
-        <p:cxnSp>
-          <p:nvCxnSpPr>
-            <p:cNvPr id="61" name="Straight Connector 60">
-              <a:extLst>
-                <a:ext uri="{FF2B5EF4-FFF2-40B4-BE49-F238E27FC236}">
-                  <a16:creationId xmlns:a16="http://schemas.microsoft.com/office/drawing/2014/main" id="{FCD45DA7-6941-48BA-9D89-9D34C903BE4C}"/>
-                </a:ext>
-              </a:extLst>
-            </p:cNvPr>
-            <p:cNvCxnSpPr>
-              <a:cxnSpLocks/>
-              <a:stCxn id="48" idx="0"/>
-              <a:endCxn id="45" idx="1"/>
-            </p:cNvCxnSpPr>
-            <p:nvPr/>
-          </p:nvCxnSpPr>
-          <p:spPr>
-            <a:xfrm flipH="1" flipV="1">
-              <a:off x="4645047" y="2189533"/>
-              <a:ext cx="599791" cy="1020735"/>
-            </a:xfrm>
-            <a:prstGeom prst="line">
-              <a:avLst/>
-            </a:prstGeom>
-            <a:ln w="25400">
-              <a:solidFill>
-                <a:schemeClr val="tx1"/>
-              </a:solidFill>
-            </a:ln>
-          </p:spPr>
-          <p:style>
-            <a:lnRef idx="1">
-              <a:schemeClr val="accent1"/>
-            </a:lnRef>
-            <a:fillRef idx="0">
-              <a:schemeClr val="accent1"/>
-            </a:fillRef>
-            <a:effectRef idx="0">
-              <a:schemeClr val="accent1"/>
-            </a:effectRef>
-            <a:fontRef idx="minor">
-              <a:schemeClr val="tx1"/>
-            </a:fontRef>
-          </p:style>
-        </p:cxnSp>
-        <p:cxnSp>
-          <p:nvCxnSpPr>
-            <p:cNvPr id="64" name="Straight Connector 63">
-              <a:extLst>
-                <a:ext uri="{FF2B5EF4-FFF2-40B4-BE49-F238E27FC236}">
-                  <a16:creationId xmlns:a16="http://schemas.microsoft.com/office/drawing/2014/main" id="{ABEE147E-B2E7-4C16-8B2B-6E1EFDBD6567}"/>
-                </a:ext>
-              </a:extLst>
-            </p:cNvPr>
-            <p:cNvCxnSpPr>
-              <a:cxnSpLocks/>
-              <a:stCxn id="51" idx="0"/>
-              <a:endCxn id="50" idx="5"/>
-            </p:cNvCxnSpPr>
-            <p:nvPr/>
-          </p:nvCxnSpPr>
-          <p:spPr>
-            <a:xfrm flipV="1">
-              <a:off x="6616438" y="2189534"/>
-              <a:ext cx="683195" cy="1020735"/>
-            </a:xfrm>
-            <a:prstGeom prst="line">
-              <a:avLst/>
-            </a:prstGeom>
-            <a:ln w="25400">
-              <a:solidFill>
-                <a:schemeClr val="tx1"/>
-              </a:solidFill>
-              <a:headEnd type="none"/>
-            </a:ln>
-          </p:spPr>
-          <p:style>
-            <a:lnRef idx="1">
-              <a:schemeClr val="accent1"/>
-            </a:lnRef>
-            <a:fillRef idx="0">
-              <a:schemeClr val="accent1"/>
-            </a:fillRef>
-            <a:effectRef idx="0">
-              <a:schemeClr val="accent1"/>
-            </a:effectRef>
-            <a:fontRef idx="minor">
-              <a:schemeClr val="tx1"/>
-            </a:fontRef>
-          </p:style>
-        </p:cxnSp>
-        <p:cxnSp>
-          <p:nvCxnSpPr>
-            <p:cNvPr id="67" name="Straight Connector 66">
-              <a:extLst>
-                <a:ext uri="{FF2B5EF4-FFF2-40B4-BE49-F238E27FC236}">
-                  <a16:creationId xmlns:a16="http://schemas.microsoft.com/office/drawing/2014/main" id="{85BB5E8E-008A-4BC4-B89A-DF90B4A77FA0}"/>
-                </a:ext>
-              </a:extLst>
-            </p:cNvPr>
-            <p:cNvCxnSpPr>
-              <a:cxnSpLocks/>
-              <a:stCxn id="52" idx="0"/>
-              <a:endCxn id="50" idx="1"/>
-            </p:cNvCxnSpPr>
-            <p:nvPr/>
-          </p:nvCxnSpPr>
-          <p:spPr>
-            <a:xfrm flipH="1" flipV="1">
-              <a:off x="7642533" y="2189534"/>
-              <a:ext cx="599791" cy="1020735"/>
-            </a:xfrm>
-            <a:prstGeom prst="line">
-              <a:avLst/>
-            </a:prstGeom>
-            <a:ln w="25400">
-              <a:solidFill>
-                <a:schemeClr val="tx1"/>
-              </a:solidFill>
-              <a:headEnd type="none"/>
-              <a:tailEnd type="none"/>
-            </a:ln>
-          </p:spPr>
-          <p:style>
-            <a:lnRef idx="1">
-              <a:schemeClr val="accent1"/>
-            </a:lnRef>
-            <a:fillRef idx="0">
-              <a:schemeClr val="accent1"/>
-            </a:fillRef>
-            <a:effectRef idx="0">
-              <a:schemeClr val="accent1"/>
-            </a:effectRef>
-            <a:fontRef idx="minor">
-              <a:schemeClr val="tx1"/>
-            </a:fontRef>
-          </p:style>
-        </p:cxnSp>
-        <mc:AlternateContent xmlns:mc="http://schemas.openxmlformats.org/markup-compatibility/2006">
-          <mc:Choice xmlns:a14="http://schemas.microsoft.com/office/drawing/2010/main" Requires="a14">
-            <p:sp>
-              <p:nvSpPr>
-                <p:cNvPr id="74" name="TextBox 73">
-                  <a:extLst>
-                    <a:ext uri="{FF2B5EF4-FFF2-40B4-BE49-F238E27FC236}">
-                      <a16:creationId xmlns:a16="http://schemas.microsoft.com/office/drawing/2014/main" id="{6B14C8CB-D491-4730-896F-18D39250ACFB}"/>
-                    </a:ext>
-                  </a:extLst>
-                </p:cNvPr>
-                <p:cNvSpPr txBox="1"/>
-                <p:nvPr/>
-              </p:nvSpPr>
-              <p:spPr>
-                <a:xfrm>
-                  <a:off x="2892859" y="3974812"/>
-                  <a:ext cx="1371600" cy="369332"/>
-                </a:xfrm>
-                <a:prstGeom prst="rect">
-                  <a:avLst/>
-                </a:prstGeom>
-                <a:noFill/>
-              </p:spPr>
-              <p:txBody>
-                <a:bodyPr wrap="square" rtlCol="1">
-                  <a:spAutoFit/>
-                </a:bodyPr>
-                <a:lstStyle/>
-                <a:p>
-                  <a:pPr/>
-                  <a14:m>
-                    <m:oMathPara xmlns:m="http://schemas.openxmlformats.org/officeDocument/2006/math">
-                      <m:oMathParaPr>
-                        <m:jc m:val="centerGroup"/>
-                      </m:oMathParaPr>
-                      <m:oMath xmlns:m="http://schemas.openxmlformats.org/officeDocument/2006/math">
-                        <m:r>
-                          <a:rPr lang="en-US" b="0" i="1" smtClean="0">
-                            <a:latin typeface="Cambria Math" panose="02040503050406030204" pitchFamily="18" charset="0"/>
-                          </a:rPr>
-                          <m:t>h</m:t>
-                        </m:r>
-                        <m:r>
-                          <a:rPr lang="en-US" b="0" i="1" smtClean="0">
-                            <a:latin typeface="Cambria Math" panose="02040503050406030204" pitchFamily="18" charset="0"/>
-                          </a:rPr>
-                          <m:t>=</m:t>
-                        </m:r>
-                        <m:r>
-                          <a:rPr lang="en-US" b="0" i="1" smtClean="0">
-                            <a:latin typeface="Cambria Math" panose="02040503050406030204" pitchFamily="18" charset="0"/>
-                          </a:rPr>
-                          <m:t>−</m:t>
-                        </m:r>
-                        <m:r>
-                          <a:rPr lang="en-US" b="0" i="1" smtClean="0">
-                            <a:latin typeface="Cambria Math" panose="02040503050406030204" pitchFamily="18" charset="0"/>
-                          </a:rPr>
-                          <m:t>3</m:t>
-                        </m:r>
-                      </m:oMath>
-                    </m:oMathPara>
-                  </a14:m>
-                  <a:endParaRPr lang="he-IL" dirty="0"/>
-                </a:p>
-              </p:txBody>
-            </p:sp>
-          </mc:Choice>
-          <mc:Fallback>
-            <p:sp>
-              <p:nvSpPr>
-                <p:cNvPr id="74" name="TextBox 73">
-                  <a:extLst>
-                    <a:ext uri="{FF2B5EF4-FFF2-40B4-BE49-F238E27FC236}">
-                      <a16:creationId xmlns:a16="http://schemas.microsoft.com/office/drawing/2014/main" id="{6B14C8CB-D491-4730-896F-18D39250ACFB}"/>
-                    </a:ext>
-                  </a:extLst>
-                </p:cNvPr>
-                <p:cNvSpPr txBox="1">
-                  <a:spLocks noRot="1" noChangeAspect="1" noMove="1" noResize="1" noEditPoints="1" noAdjustHandles="1" noChangeArrowheads="1" noChangeShapeType="1" noTextEdit="1"/>
-                </p:cNvSpPr>
-                <p:nvPr/>
-              </p:nvSpPr>
-              <p:spPr>
-                <a:xfrm>
-                  <a:off x="2892859" y="3974812"/>
-                  <a:ext cx="1371600" cy="369332"/>
-                </a:xfrm>
-                <a:prstGeom prst="rect">
-                  <a:avLst/>
-                </a:prstGeom>
-                <a:blipFill>
-                  <a:blip r:embed="rId2"/>
-                  <a:stretch>
-                    <a:fillRect/>
-                  </a:stretch>
-                </a:blipFill>
-              </p:spPr>
-              <p:txBody>
-                <a:bodyPr/>
-                <a:lstStyle/>
-                <a:p>
-                  <a:r>
-                    <a:rPr lang="he-IL">
-                      <a:noFill/>
-                    </a:rPr>
-                    <a:t> </a:t>
-                  </a:r>
-                </a:p>
-              </p:txBody>
-            </p:sp>
-          </mc:Fallback>
-        </mc:AlternateContent>
-        <mc:AlternateContent xmlns:mc="http://schemas.openxmlformats.org/markup-compatibility/2006">
-          <mc:Choice xmlns:a14="http://schemas.microsoft.com/office/drawing/2010/main" Requires="a14">
-            <p:sp>
-              <p:nvSpPr>
-                <p:cNvPr id="75" name="TextBox 74">
-                  <a:extLst>
-                    <a:ext uri="{FF2B5EF4-FFF2-40B4-BE49-F238E27FC236}">
-                      <a16:creationId xmlns:a16="http://schemas.microsoft.com/office/drawing/2014/main" id="{A607AD59-BD38-49E9-BB32-47745D6BD69A}"/>
-                    </a:ext>
-                  </a:extLst>
-                </p:cNvPr>
-                <p:cNvSpPr txBox="1"/>
-                <p:nvPr/>
-              </p:nvSpPr>
-              <p:spPr>
-                <a:xfrm>
-                  <a:off x="4556023" y="3974812"/>
-                  <a:ext cx="1371600" cy="369332"/>
-                </a:xfrm>
-                <a:prstGeom prst="rect">
-                  <a:avLst/>
-                </a:prstGeom>
-                <a:noFill/>
-              </p:spPr>
-              <p:txBody>
-                <a:bodyPr wrap="square" rtlCol="1">
-                  <a:spAutoFit/>
-                </a:bodyPr>
-                <a:lstStyle/>
-                <a:p>
-                  <a:pPr/>
-                  <a14:m>
-                    <m:oMathPara xmlns:m="http://schemas.openxmlformats.org/officeDocument/2006/math">
-                      <m:oMathParaPr>
-                        <m:jc m:val="centerGroup"/>
-                      </m:oMathParaPr>
-                      <m:oMath xmlns:m="http://schemas.openxmlformats.org/officeDocument/2006/math">
-                        <m:r>
-                          <a:rPr lang="en-US" b="0" i="1" smtClean="0">
-                            <a:latin typeface="Cambria Math" panose="02040503050406030204" pitchFamily="18" charset="0"/>
-                          </a:rPr>
-                          <m:t>h</m:t>
-                        </m:r>
-                        <m:r>
-                          <a:rPr lang="en-US" b="0" i="1" smtClean="0">
-                            <a:latin typeface="Cambria Math" panose="02040503050406030204" pitchFamily="18" charset="0"/>
-                          </a:rPr>
-                          <m:t>=</m:t>
-                        </m:r>
-                        <m:r>
-                          <a:rPr lang="en-US" b="0" i="1" smtClean="0">
-                            <a:latin typeface="Cambria Math" panose="02040503050406030204" pitchFamily="18" charset="0"/>
-                          </a:rPr>
-                          <m:t>2</m:t>
-                        </m:r>
-                      </m:oMath>
-                    </m:oMathPara>
-                  </a14:m>
-                  <a:endParaRPr lang="he-IL" dirty="0"/>
-                </a:p>
-              </p:txBody>
-            </p:sp>
-          </mc:Choice>
-          <mc:Fallback>
-            <p:sp>
-              <p:nvSpPr>
-                <p:cNvPr id="75" name="TextBox 74">
-                  <a:extLst>
-                    <a:ext uri="{FF2B5EF4-FFF2-40B4-BE49-F238E27FC236}">
-                      <a16:creationId xmlns:a16="http://schemas.microsoft.com/office/drawing/2014/main" id="{A607AD59-BD38-49E9-BB32-47745D6BD69A}"/>
-                    </a:ext>
-                  </a:extLst>
-                </p:cNvPr>
-                <p:cNvSpPr txBox="1">
-                  <a:spLocks noRot="1" noChangeAspect="1" noMove="1" noResize="1" noEditPoints="1" noAdjustHandles="1" noChangeArrowheads="1" noChangeShapeType="1" noTextEdit="1"/>
-                </p:cNvSpPr>
-                <p:nvPr/>
-              </p:nvSpPr>
-              <p:spPr>
-                <a:xfrm>
-                  <a:off x="4556023" y="3974812"/>
-                  <a:ext cx="1371600" cy="369332"/>
-                </a:xfrm>
-                <a:prstGeom prst="rect">
-                  <a:avLst/>
-                </a:prstGeom>
-                <a:blipFill>
-                  <a:blip r:embed="rId3"/>
-                  <a:stretch>
-                    <a:fillRect/>
-                  </a:stretch>
-                </a:blipFill>
-              </p:spPr>
-              <p:txBody>
-                <a:bodyPr/>
-                <a:lstStyle/>
-                <a:p>
-                  <a:r>
-                    <a:rPr lang="he-IL">
-                      <a:noFill/>
-                    </a:rPr>
-                    <a:t> </a:t>
-                  </a:r>
-                </a:p>
-              </p:txBody>
-            </p:sp>
-          </mc:Fallback>
-        </mc:AlternateContent>
-        <mc:AlternateContent xmlns:mc="http://schemas.openxmlformats.org/markup-compatibility/2006">
-          <mc:Choice xmlns:a14="http://schemas.microsoft.com/office/drawing/2010/main" Requires="a14">
-            <p:sp>
-              <p:nvSpPr>
-                <p:cNvPr id="76" name="TextBox 75">
-                  <a:extLst>
-                    <a:ext uri="{FF2B5EF4-FFF2-40B4-BE49-F238E27FC236}">
-                      <a16:creationId xmlns:a16="http://schemas.microsoft.com/office/drawing/2014/main" id="{1085024F-EA78-4321-91BB-60E0AF025C3E}"/>
-                    </a:ext>
-                  </a:extLst>
-                </p:cNvPr>
-                <p:cNvSpPr txBox="1"/>
-                <p:nvPr/>
-              </p:nvSpPr>
-              <p:spPr>
-                <a:xfrm>
-                  <a:off x="5927623" y="3974812"/>
-                  <a:ext cx="1371600" cy="369332"/>
-                </a:xfrm>
-                <a:prstGeom prst="rect">
-                  <a:avLst/>
-                </a:prstGeom>
-                <a:noFill/>
-              </p:spPr>
-              <p:txBody>
-                <a:bodyPr wrap="square" rtlCol="1">
-                  <a:spAutoFit/>
-                </a:bodyPr>
-                <a:lstStyle/>
-                <a:p>
-                  <a:pPr/>
-                  <a14:m>
-                    <m:oMathPara xmlns:m="http://schemas.openxmlformats.org/officeDocument/2006/math">
-                      <m:oMathParaPr>
-                        <m:jc m:val="centerGroup"/>
-                      </m:oMathParaPr>
-                      <m:oMath xmlns:m="http://schemas.openxmlformats.org/officeDocument/2006/math">
-                        <m:r>
-                          <a:rPr lang="en-US" b="0" i="1" smtClean="0">
-                            <a:latin typeface="Cambria Math" panose="02040503050406030204" pitchFamily="18" charset="0"/>
-                          </a:rPr>
-                          <m:t>h</m:t>
-                        </m:r>
-                        <m:r>
-                          <a:rPr lang="en-US" b="0" i="1" smtClean="0">
-                            <a:latin typeface="Cambria Math" panose="02040503050406030204" pitchFamily="18" charset="0"/>
-                          </a:rPr>
-                          <m:t>=</m:t>
-                        </m:r>
-                        <m:r>
-                          <a:rPr lang="en-US" b="0" i="1" smtClean="0">
-                            <a:latin typeface="Cambria Math" panose="02040503050406030204" pitchFamily="18" charset="0"/>
-                          </a:rPr>
-                          <m:t>1</m:t>
-                        </m:r>
-                      </m:oMath>
-                    </m:oMathPara>
-                  </a14:m>
-                  <a:endParaRPr lang="he-IL" dirty="0"/>
-                </a:p>
-              </p:txBody>
-            </p:sp>
-          </mc:Choice>
-          <mc:Fallback>
-            <p:sp>
-              <p:nvSpPr>
-                <p:cNvPr id="76" name="TextBox 75">
-                  <a:extLst>
-                    <a:ext uri="{FF2B5EF4-FFF2-40B4-BE49-F238E27FC236}">
-                      <a16:creationId xmlns:a16="http://schemas.microsoft.com/office/drawing/2014/main" id="{1085024F-EA78-4321-91BB-60E0AF025C3E}"/>
-                    </a:ext>
-                  </a:extLst>
-                </p:cNvPr>
-                <p:cNvSpPr txBox="1">
-                  <a:spLocks noRot="1" noChangeAspect="1" noMove="1" noResize="1" noEditPoints="1" noAdjustHandles="1" noChangeArrowheads="1" noChangeShapeType="1" noTextEdit="1"/>
-                </p:cNvSpPr>
-                <p:nvPr/>
-              </p:nvSpPr>
-              <p:spPr>
-                <a:xfrm>
-                  <a:off x="5927623" y="3974812"/>
-                  <a:ext cx="1371600" cy="369332"/>
-                </a:xfrm>
-                <a:prstGeom prst="rect">
-                  <a:avLst/>
-                </a:prstGeom>
-                <a:blipFill>
-                  <a:blip r:embed="rId4"/>
-                  <a:stretch>
-                    <a:fillRect/>
-                  </a:stretch>
-                </a:blipFill>
-              </p:spPr>
-              <p:txBody>
-                <a:bodyPr/>
-                <a:lstStyle/>
-                <a:p>
-                  <a:r>
-                    <a:rPr lang="he-IL">
-                      <a:noFill/>
-                    </a:rPr>
-                    <a:t> </a:t>
-                  </a:r>
-                </a:p>
-              </p:txBody>
-            </p:sp>
-          </mc:Fallback>
-        </mc:AlternateContent>
-        <mc:AlternateContent xmlns:mc="http://schemas.openxmlformats.org/markup-compatibility/2006">
-          <mc:Choice xmlns:a14="http://schemas.microsoft.com/office/drawing/2010/main" Requires="a14">
-            <p:sp>
-              <p:nvSpPr>
-                <p:cNvPr id="77" name="TextBox 76">
-                  <a:extLst>
-                    <a:ext uri="{FF2B5EF4-FFF2-40B4-BE49-F238E27FC236}">
-                      <a16:creationId xmlns:a16="http://schemas.microsoft.com/office/drawing/2014/main" id="{FC4FE4AA-61E3-404A-ABEA-9E6864F2A155}"/>
-                    </a:ext>
-                  </a:extLst>
-                </p:cNvPr>
-                <p:cNvSpPr txBox="1"/>
-                <p:nvPr/>
-              </p:nvSpPr>
-              <p:spPr>
-                <a:xfrm>
-                  <a:off x="7556524" y="3974812"/>
-                  <a:ext cx="1371600" cy="369332"/>
-                </a:xfrm>
-                <a:prstGeom prst="rect">
-                  <a:avLst/>
-                </a:prstGeom>
-                <a:noFill/>
-              </p:spPr>
-              <p:txBody>
-                <a:bodyPr wrap="square" rtlCol="1">
-                  <a:spAutoFit/>
-                </a:bodyPr>
-                <a:lstStyle/>
-                <a:p>
-                  <a:pPr/>
-                  <a14:m>
-                    <m:oMathPara xmlns:m="http://schemas.openxmlformats.org/officeDocument/2006/math">
-                      <m:oMathParaPr>
-                        <m:jc m:val="centerGroup"/>
-                      </m:oMathParaPr>
-                      <m:oMath xmlns:m="http://schemas.openxmlformats.org/officeDocument/2006/math">
-                        <m:r>
-                          <a:rPr lang="en-US" b="0" i="1" smtClean="0">
-                            <a:latin typeface="Cambria Math" panose="02040503050406030204" pitchFamily="18" charset="0"/>
-                          </a:rPr>
-                          <m:t>𝑢</m:t>
-                        </m:r>
-                        <m:r>
-                          <a:rPr lang="en-US" b="0" i="1" smtClean="0">
-                            <a:latin typeface="Cambria Math" panose="02040503050406030204" pitchFamily="18" charset="0"/>
-                          </a:rPr>
-                          <m:t>=</m:t>
-                        </m:r>
-                        <m:r>
-                          <a:rPr lang="en-US" b="0" i="1" smtClean="0">
-                            <a:latin typeface="Cambria Math" panose="02040503050406030204" pitchFamily="18" charset="0"/>
-                          </a:rPr>
-                          <m:t>−</m:t>
-                        </m:r>
-                        <m:r>
-                          <a:rPr lang="en-US" b="0" i="1" smtClean="0">
-                            <a:latin typeface="Cambria Math" panose="02040503050406030204" pitchFamily="18" charset="0"/>
-                          </a:rPr>
-                          <m:t>1</m:t>
-                        </m:r>
-                      </m:oMath>
-                    </m:oMathPara>
-                  </a14:m>
-                  <a:endParaRPr lang="he-IL" dirty="0"/>
-                </a:p>
-              </p:txBody>
-            </p:sp>
-          </mc:Choice>
-          <mc:Fallback>
-            <p:sp>
-              <p:nvSpPr>
-                <p:cNvPr id="77" name="TextBox 76">
-                  <a:extLst>
-                    <a:ext uri="{FF2B5EF4-FFF2-40B4-BE49-F238E27FC236}">
-                      <a16:creationId xmlns:a16="http://schemas.microsoft.com/office/drawing/2014/main" id="{FC4FE4AA-61E3-404A-ABEA-9E6864F2A155}"/>
-                    </a:ext>
-                  </a:extLst>
-                </p:cNvPr>
-                <p:cNvSpPr txBox="1">
-                  <a:spLocks noRot="1" noChangeAspect="1" noMove="1" noResize="1" noEditPoints="1" noAdjustHandles="1" noChangeArrowheads="1" noChangeShapeType="1" noTextEdit="1"/>
-                </p:cNvSpPr>
-                <p:nvPr/>
-              </p:nvSpPr>
-              <p:spPr>
-                <a:xfrm>
-                  <a:off x="7556524" y="3974812"/>
-                  <a:ext cx="1371600" cy="369332"/>
-                </a:xfrm>
-                <a:prstGeom prst="rect">
-                  <a:avLst/>
-                </a:prstGeom>
-                <a:blipFill>
-                  <a:blip r:embed="rId5"/>
-                  <a:stretch>
-                    <a:fillRect/>
-                  </a:stretch>
-                </a:blipFill>
-              </p:spPr>
-              <p:txBody>
-                <a:bodyPr/>
-                <a:lstStyle/>
-                <a:p>
-                  <a:r>
-                    <a:rPr lang="he-IL">
-                      <a:noFill/>
-                    </a:rPr>
-                    <a:t> </a:t>
-                  </a:r>
-                </a:p>
-              </p:txBody>
-            </p:sp>
-          </mc:Fallback>
-        </mc:AlternateContent>
-        <p:sp>
-          <p:nvSpPr>
-            <p:cNvPr id="19" name="TextBox 18">
-              <a:extLst>
-                <a:ext uri="{FF2B5EF4-FFF2-40B4-BE49-F238E27FC236}">
-                  <a16:creationId xmlns:a16="http://schemas.microsoft.com/office/drawing/2014/main" id="{F5D4EAF9-6850-439D-A061-9416AB5D49B7}"/>
-                </a:ext>
-              </a:extLst>
-            </p:cNvPr>
-            <p:cNvSpPr txBox="1"/>
-            <p:nvPr/>
-          </p:nvSpPr>
-          <p:spPr>
-            <a:xfrm>
-              <a:off x="9569483" y="2598945"/>
-              <a:ext cx="1114141" cy="369332"/>
-            </a:xfrm>
-            <a:prstGeom prst="rect">
-              <a:avLst/>
-            </a:prstGeom>
-            <a:noFill/>
-          </p:spPr>
-          <p:txBody>
-            <a:bodyPr wrap="square" rtlCol="1">
-              <a:spAutoFit/>
-            </a:bodyPr>
-            <a:lstStyle/>
-            <a:p>
-              <a:r>
-                <a:rPr lang="en-US" dirty="0">
-                  <a:latin typeface="David" panose="020E0502060401010101" pitchFamily="34" charset="-79"/>
-                  <a:cs typeface="David" panose="020E0502060401010101" pitchFamily="34" charset="-79"/>
-                </a:rPr>
-                <a:t>LEAF</a:t>
-              </a:r>
-              <a:endParaRPr lang="he-IL" dirty="0">
-                <a:latin typeface="David" panose="020E0502060401010101" pitchFamily="34" charset="-79"/>
-                <a:cs typeface="David" panose="020E0502060401010101" pitchFamily="34" charset="-79"/>
-              </a:endParaRPr>
-            </a:p>
-          </p:txBody>
-        </p:sp>
-        <p:sp>
-          <p:nvSpPr>
-            <p:cNvPr id="79" name="TextBox 78">
-              <a:extLst>
-                <a:ext uri="{FF2B5EF4-FFF2-40B4-BE49-F238E27FC236}">
-                  <a16:creationId xmlns:a16="http://schemas.microsoft.com/office/drawing/2014/main" id="{6E0BEF9F-9D59-4EB7-8CA3-CD5F7CB75F72}"/>
-                </a:ext>
-              </a:extLst>
-            </p:cNvPr>
-            <p:cNvSpPr txBox="1"/>
-            <p:nvPr/>
-          </p:nvSpPr>
-          <p:spPr>
-            <a:xfrm>
-              <a:off x="9569483" y="1730547"/>
-              <a:ext cx="1114141" cy="369332"/>
-            </a:xfrm>
-            <a:prstGeom prst="rect">
-              <a:avLst/>
-            </a:prstGeom>
-            <a:noFill/>
-          </p:spPr>
-          <p:txBody>
-            <a:bodyPr wrap="square" rtlCol="1">
-              <a:spAutoFit/>
-            </a:bodyPr>
-            <a:lstStyle/>
-            <a:p>
-              <a:r>
-                <a:rPr lang="en-US" dirty="0">
-                  <a:latin typeface="David" panose="020E0502060401010101" pitchFamily="34" charset="-79"/>
-                  <a:cs typeface="David" panose="020E0502060401010101" pitchFamily="34" charset="-79"/>
-                </a:rPr>
-                <a:t>MIN</a:t>
-              </a:r>
-              <a:endParaRPr lang="he-IL" dirty="0">
-                <a:latin typeface="David" panose="020E0502060401010101" pitchFamily="34" charset="-79"/>
-                <a:cs typeface="David" panose="020E0502060401010101" pitchFamily="34" charset="-79"/>
-              </a:endParaRPr>
-            </a:p>
-          </p:txBody>
-        </p:sp>
-        <p:sp>
-          <p:nvSpPr>
-            <p:cNvPr id="83" name="Isosceles Triangle 82">
-              <a:extLst>
-                <a:ext uri="{FF2B5EF4-FFF2-40B4-BE49-F238E27FC236}">
-                  <a16:creationId xmlns:a16="http://schemas.microsoft.com/office/drawing/2014/main" id="{4FAC92D0-6C15-4479-B0F0-5E4B4CEADFA3}"/>
-                </a:ext>
-              </a:extLst>
-            </p:cNvPr>
-            <p:cNvSpPr/>
-            <p:nvPr/>
-          </p:nvSpPr>
-          <p:spPr>
-            <a:xfrm>
-              <a:off x="8680690" y="915528"/>
-              <a:ext cx="685800" cy="548640"/>
-            </a:xfrm>
-            <a:prstGeom prst="triangle">
-              <a:avLst/>
-            </a:prstGeom>
-            <a:solidFill>
-              <a:srgbClr val="0070C0"/>
-            </a:solidFill>
-            <a:ln w="25400">
-              <a:solidFill>
-                <a:schemeClr val="tx1"/>
-              </a:solidFill>
-            </a:ln>
-          </p:spPr>
-          <p:style>
-            <a:lnRef idx="2">
-              <a:schemeClr val="accent1">
-                <a:shade val="50000"/>
-              </a:schemeClr>
-            </a:lnRef>
-            <a:fillRef idx="1">
-              <a:schemeClr val="accent1"/>
-            </a:fillRef>
-            <a:effectRef idx="0">
-              <a:schemeClr val="accent1"/>
-            </a:effectRef>
-            <a:fontRef idx="minor">
-              <a:schemeClr val="lt1"/>
-            </a:fontRef>
-          </p:style>
-          <p:txBody>
-            <a:bodyPr rtlCol="1" anchor="ctr"/>
-            <a:lstStyle/>
-            <a:p>
-              <a:pPr algn="ctr"/>
-              <a:endParaRPr lang="he-IL"/>
-            </a:p>
-          </p:txBody>
-        </p:sp>
-        <p:sp>
-          <p:nvSpPr>
-            <p:cNvPr id="85" name="Isosceles Triangle 84">
-              <a:extLst>
-                <a:ext uri="{FF2B5EF4-FFF2-40B4-BE49-F238E27FC236}">
-                  <a16:creationId xmlns:a16="http://schemas.microsoft.com/office/drawing/2014/main" id="{793C3994-8A68-4663-960C-3CF9EE5F7F2A}"/>
-                </a:ext>
-              </a:extLst>
-            </p:cNvPr>
-            <p:cNvSpPr/>
-            <p:nvPr/>
-          </p:nvSpPr>
-          <p:spPr>
-            <a:xfrm rot="10800000">
-              <a:off x="8680690" y="1732392"/>
-              <a:ext cx="685800" cy="548640"/>
-            </a:xfrm>
-            <a:prstGeom prst="triangle">
-              <a:avLst/>
-            </a:prstGeom>
-            <a:solidFill>
-              <a:srgbClr val="FF0000"/>
-            </a:solidFill>
-            <a:ln w="25400">
-              <a:solidFill>
-                <a:schemeClr val="tx1"/>
-              </a:solidFill>
-            </a:ln>
-          </p:spPr>
-          <p:style>
-            <a:lnRef idx="2">
-              <a:schemeClr val="accent1">
-                <a:shade val="50000"/>
-              </a:schemeClr>
-            </a:lnRef>
-            <a:fillRef idx="1">
-              <a:schemeClr val="accent1"/>
-            </a:fillRef>
-            <a:effectRef idx="0">
-              <a:schemeClr val="accent1"/>
-            </a:effectRef>
-            <a:fontRef idx="minor">
-              <a:schemeClr val="lt1"/>
-            </a:fontRef>
-          </p:style>
-          <p:txBody>
-            <a:bodyPr rtlCol="1" anchor="ctr"/>
-            <a:lstStyle/>
-            <a:p>
-              <a:pPr algn="ctr"/>
-              <a:endParaRPr lang="he-IL"/>
-            </a:p>
-          </p:txBody>
-        </p:sp>
-        <p:sp>
-          <p:nvSpPr>
-            <p:cNvPr id="86" name="Rectangle 85">
-              <a:extLst>
-                <a:ext uri="{FF2B5EF4-FFF2-40B4-BE49-F238E27FC236}">
-                  <a16:creationId xmlns:a16="http://schemas.microsoft.com/office/drawing/2014/main" id="{A02E479A-0575-4438-A0FC-797389076E2B}"/>
-                </a:ext>
-              </a:extLst>
-            </p:cNvPr>
-            <p:cNvSpPr/>
-            <p:nvPr/>
-          </p:nvSpPr>
-          <p:spPr>
-            <a:xfrm>
-              <a:off x="8680690" y="2510702"/>
-              <a:ext cx="685800" cy="685800"/>
-            </a:xfrm>
-            <a:prstGeom prst="rect">
-              <a:avLst/>
-            </a:prstGeom>
-            <a:ln w="25400">
-              <a:solidFill>
-                <a:schemeClr val="tx1"/>
-              </a:solidFill>
-            </a:ln>
-          </p:spPr>
-          <p:style>
-            <a:lnRef idx="2">
-              <a:schemeClr val="accent1">
-                <a:shade val="50000"/>
-              </a:schemeClr>
-            </a:lnRef>
-            <a:fillRef idx="1">
-              <a:schemeClr val="accent1"/>
-            </a:fillRef>
-            <a:effectRef idx="0">
-              <a:schemeClr val="accent1"/>
-            </a:effectRef>
-            <a:fontRef idx="minor">
-              <a:schemeClr val="lt1"/>
-            </a:fontRef>
-          </p:style>
-          <p:txBody>
-            <a:bodyPr rtlCol="1" anchor="ctr"/>
-            <a:lstStyle/>
-            <a:p>
-              <a:pPr algn="ctr"/>
-              <a:endParaRPr lang="he-IL"/>
-            </a:p>
-          </p:txBody>
-        </p:sp>
-        <p:sp>
-          <p:nvSpPr>
-            <p:cNvPr id="87" name="TextBox 86">
-              <a:extLst>
-                <a:ext uri="{FF2B5EF4-FFF2-40B4-BE49-F238E27FC236}">
-                  <a16:creationId xmlns:a16="http://schemas.microsoft.com/office/drawing/2014/main" id="{BC4A4F4A-1FFE-4D8B-AEB9-DC2FA23CAF10}"/>
-                </a:ext>
-              </a:extLst>
-            </p:cNvPr>
-            <p:cNvSpPr txBox="1"/>
-            <p:nvPr/>
-          </p:nvSpPr>
-          <p:spPr>
-            <a:xfrm>
-              <a:off x="9569483" y="1005182"/>
-              <a:ext cx="1114141" cy="369332"/>
-            </a:xfrm>
-            <a:prstGeom prst="rect">
-              <a:avLst/>
-            </a:prstGeom>
-            <a:noFill/>
-          </p:spPr>
-          <p:txBody>
-            <a:bodyPr wrap="square" rtlCol="1">
-              <a:spAutoFit/>
-            </a:bodyPr>
-            <a:lstStyle/>
-            <a:p>
-              <a:r>
-                <a:rPr lang="en-US" dirty="0">
-                  <a:latin typeface="David" panose="020E0502060401010101" pitchFamily="34" charset="-79"/>
-                  <a:cs typeface="David" panose="020E0502060401010101" pitchFamily="34" charset="-79"/>
-                </a:rPr>
-                <a:t>MAX</a:t>
-              </a:r>
-              <a:endParaRPr lang="he-IL" dirty="0">
-                <a:latin typeface="David" panose="020E0502060401010101" pitchFamily="34" charset="-79"/>
-                <a:cs typeface="David" panose="020E0502060401010101" pitchFamily="34" charset="-79"/>
-              </a:endParaRPr>
-            </a:p>
-          </p:txBody>
-        </p:sp>
-        <mc:AlternateContent xmlns:mc="http://schemas.openxmlformats.org/markup-compatibility/2006">
-          <mc:Choice xmlns:a14="http://schemas.microsoft.com/office/drawing/2010/main" Requires="a14">
-            <p:sp>
-              <p:nvSpPr>
-                <p:cNvPr id="32" name="TextBox 31">
-                  <a:extLst>
-                    <a:ext uri="{FF2B5EF4-FFF2-40B4-BE49-F238E27FC236}">
-                      <a16:creationId xmlns:a16="http://schemas.microsoft.com/office/drawing/2014/main" id="{4AC0FB76-6D95-4D05-987D-60D0669D9F93}"/>
-                    </a:ext>
-                  </a:extLst>
-                </p:cNvPr>
-                <p:cNvSpPr txBox="1"/>
-                <p:nvPr/>
-              </p:nvSpPr>
-              <p:spPr>
-                <a:xfrm>
-                  <a:off x="6404573" y="696313"/>
-                  <a:ext cx="1371600" cy="646331"/>
-                </a:xfrm>
-                <a:prstGeom prst="rect">
-                  <a:avLst/>
-                </a:prstGeom>
-                <a:noFill/>
-              </p:spPr>
-              <p:txBody>
-                <a:bodyPr wrap="square" rtlCol="1">
-                  <a:spAutoFit/>
-                </a:bodyPr>
-                <a:lstStyle/>
-                <a:p>
-                  <a:pPr/>
-                  <a:r>
-                    <a:rPr lang="en-US" b="0" dirty="0">
-                      <a:latin typeface="David" panose="020E0502060401010101" pitchFamily="34" charset="-79"/>
-                      <a:cs typeface="David" panose="020E0502060401010101" pitchFamily="34" charset="-79"/>
-                    </a:rPr>
-                    <a:t>Alpha:</a:t>
-                  </a:r>
-                  <a14:m>
-                    <m:oMath xmlns:m="http://schemas.openxmlformats.org/officeDocument/2006/math">
-                      <m:r>
-                        <a:rPr lang="en-US" b="0" i="1" smtClean="0">
-                          <a:latin typeface="Cambria Math" panose="02040503050406030204" pitchFamily="18" charset="0"/>
-                          <a:cs typeface="David" panose="020E0502060401010101" pitchFamily="34" charset="-79"/>
-                        </a:rPr>
-                        <m:t>−</m:t>
-                      </m:r>
-                      <m:r>
-                        <a:rPr lang="en-US" b="0" i="1" smtClean="0">
-                          <a:latin typeface="Cambria Math" panose="02040503050406030204" pitchFamily="18" charset="0"/>
-                          <a:ea typeface="Cambria Math" panose="02040503050406030204" pitchFamily="18" charset="0"/>
-                          <a:cs typeface="David" panose="020E0502060401010101" pitchFamily="34" charset="-79"/>
-                        </a:rPr>
-                        <m:t>∞</m:t>
-                      </m:r>
-                    </m:oMath>
-                  </a14:m>
-                  <a:endParaRPr lang="en-US" b="0" dirty="0">
-                    <a:latin typeface="David" panose="020E0502060401010101" pitchFamily="34" charset="-79"/>
-                    <a:cs typeface="David" panose="020E0502060401010101" pitchFamily="34" charset="-79"/>
-                  </a:endParaRPr>
-                </a:p>
-                <a:p>
-                  <a:pPr/>
-                  <a:r>
-                    <a:rPr lang="en-US" dirty="0">
-                      <a:latin typeface="David" panose="020E0502060401010101" pitchFamily="34" charset="-79"/>
-                      <a:cs typeface="David" panose="020E0502060401010101" pitchFamily="34" charset="-79"/>
-                    </a:rPr>
-                    <a:t>Beta:-3</a:t>
-                  </a:r>
-                  <a:endParaRPr lang="en-US" b="0" dirty="0">
-                    <a:latin typeface="David" panose="020E0502060401010101" pitchFamily="34" charset="-79"/>
-                    <a:cs typeface="David" panose="020E0502060401010101" pitchFamily="34" charset="-79"/>
-                  </a:endParaRPr>
-                </a:p>
-              </p:txBody>
-            </p:sp>
-          </mc:Choice>
-          <mc:Fallback>
-            <p:sp>
-              <p:nvSpPr>
-                <p:cNvPr id="32" name="TextBox 31">
-                  <a:extLst>
-                    <a:ext uri="{FF2B5EF4-FFF2-40B4-BE49-F238E27FC236}">
-                      <a16:creationId xmlns:a16="http://schemas.microsoft.com/office/drawing/2014/main" id="{4AC0FB76-6D95-4D05-987D-60D0669D9F93}"/>
-                    </a:ext>
-                  </a:extLst>
-                </p:cNvPr>
-                <p:cNvSpPr txBox="1">
-                  <a:spLocks noRot="1" noChangeAspect="1" noMove="1" noResize="1" noEditPoints="1" noAdjustHandles="1" noChangeArrowheads="1" noChangeShapeType="1" noTextEdit="1"/>
-                </p:cNvSpPr>
-                <p:nvPr/>
-              </p:nvSpPr>
-              <p:spPr>
-                <a:xfrm>
-                  <a:off x="6404573" y="696313"/>
-                  <a:ext cx="1371600" cy="646331"/>
-                </a:xfrm>
-                <a:prstGeom prst="rect">
-                  <a:avLst/>
-                </a:prstGeom>
-                <a:blipFill>
-                  <a:blip r:embed="rId6"/>
-                  <a:stretch>
-                    <a:fillRect l="-4000" t="-4717" b="-14151"/>
-                  </a:stretch>
-                </a:blipFill>
-              </p:spPr>
-              <p:txBody>
-                <a:bodyPr/>
-                <a:lstStyle/>
-                <a:p>
-                  <a:r>
-                    <a:rPr lang="he-IL">
-                      <a:noFill/>
-                    </a:rPr>
-                    <a:t> </a:t>
-                  </a:r>
-                </a:p>
-              </p:txBody>
-            </p:sp>
-          </mc:Fallback>
-        </mc:AlternateContent>
-      </p:grpSp>
-      <mc:AlternateContent xmlns:mc="http://schemas.openxmlformats.org/markup-compatibility/2006">
-        <mc:Choice xmlns:a14="http://schemas.microsoft.com/office/drawing/2010/main" Requires="a14">
-          <p:sp>
-            <p:nvSpPr>
-              <p:cNvPr id="29" name="TextBox 28">
-                <a:extLst>
-                  <a:ext uri="{FF2B5EF4-FFF2-40B4-BE49-F238E27FC236}">
-                    <a16:creationId xmlns:a16="http://schemas.microsoft.com/office/drawing/2014/main" id="{869F3E15-FF86-4A52-A182-7BEC5D1FCBA3}"/>
-                  </a:ext>
-                </a:extLst>
-              </p:cNvPr>
-              <p:cNvSpPr txBox="1"/>
-              <p:nvPr/>
-            </p:nvSpPr>
-            <p:spPr>
-              <a:xfrm>
-                <a:off x="4800442" y="1817522"/>
-                <a:ext cx="1371600" cy="646331"/>
-              </a:xfrm>
-              <a:prstGeom prst="rect">
-                <a:avLst/>
-              </a:prstGeom>
-              <a:noFill/>
-            </p:spPr>
-            <p:txBody>
-              <a:bodyPr wrap="square" rtlCol="1">
-                <a:spAutoFit/>
-              </a:bodyPr>
-              <a:lstStyle/>
-              <a:p>
-                <a:pPr/>
-                <a:r>
-                  <a:rPr lang="en-US" b="0" dirty="0">
-                    <a:latin typeface="David" panose="020E0502060401010101" pitchFamily="34" charset="-79"/>
-                    <a:cs typeface="David" panose="020E0502060401010101" pitchFamily="34" charset="-79"/>
-                  </a:rPr>
-                  <a:t>Alpha:</a:t>
-                </a:r>
-                <a14:m>
-                  <m:oMath xmlns:m="http://schemas.openxmlformats.org/officeDocument/2006/math">
-                    <m:r>
-                      <a:rPr lang="en-US" b="0" i="1" smtClean="0">
-                        <a:latin typeface="Cambria Math" panose="02040503050406030204" pitchFamily="18" charset="0"/>
-                        <a:cs typeface="David" panose="020E0502060401010101" pitchFamily="34" charset="-79"/>
-                      </a:rPr>
-                      <m:t>−</m:t>
-                    </m:r>
-                    <m:r>
-                      <a:rPr lang="en-US" b="0" i="1" smtClean="0">
-                        <a:latin typeface="Cambria Math" panose="02040503050406030204" pitchFamily="18" charset="0"/>
-                        <a:ea typeface="Cambria Math" panose="02040503050406030204" pitchFamily="18" charset="0"/>
-                        <a:cs typeface="David" panose="020E0502060401010101" pitchFamily="34" charset="-79"/>
-                      </a:rPr>
-                      <m:t>∞</m:t>
-                    </m:r>
-                  </m:oMath>
-                </a14:m>
-                <a:endParaRPr lang="en-US" b="0" dirty="0">
-                  <a:latin typeface="David" panose="020E0502060401010101" pitchFamily="34" charset="-79"/>
-                  <a:cs typeface="David" panose="020E0502060401010101" pitchFamily="34" charset="-79"/>
-                </a:endParaRPr>
-              </a:p>
-              <a:p>
-                <a:pPr/>
-                <a:r>
-                  <a:rPr lang="en-US" dirty="0">
-                    <a:latin typeface="David" panose="020E0502060401010101" pitchFamily="34" charset="-79"/>
-                    <a:cs typeface="David" panose="020E0502060401010101" pitchFamily="34" charset="-79"/>
-                  </a:rPr>
-                  <a:t>Beta:-3</a:t>
-                </a:r>
-                <a:endParaRPr lang="en-US" b="0" dirty="0">
-                  <a:latin typeface="David" panose="020E0502060401010101" pitchFamily="34" charset="-79"/>
-                  <a:cs typeface="David" panose="020E0502060401010101" pitchFamily="34" charset="-79"/>
-                </a:endParaRPr>
-              </a:p>
-            </p:txBody>
-          </p:sp>
-        </mc:Choice>
-        <mc:Fallback>
-          <p:sp>
-            <p:nvSpPr>
-              <p:cNvPr id="29" name="TextBox 28">
-                <a:extLst>
-                  <a:ext uri="{FF2B5EF4-FFF2-40B4-BE49-F238E27FC236}">
-                    <a16:creationId xmlns:a16="http://schemas.microsoft.com/office/drawing/2014/main" id="{869F3E15-FF86-4A52-A182-7BEC5D1FCBA3}"/>
-                  </a:ext>
-                </a:extLst>
-              </p:cNvPr>
-              <p:cNvSpPr txBox="1">
-                <a:spLocks noRot="1" noChangeAspect="1" noMove="1" noResize="1" noEditPoints="1" noAdjustHandles="1" noChangeArrowheads="1" noChangeShapeType="1" noTextEdit="1"/>
-              </p:cNvSpPr>
-              <p:nvPr/>
-            </p:nvSpPr>
-            <p:spPr>
-              <a:xfrm>
-                <a:off x="4800442" y="1817522"/>
-                <a:ext cx="1371600" cy="646331"/>
-              </a:xfrm>
-              <a:prstGeom prst="rect">
-                <a:avLst/>
-              </a:prstGeom>
-              <a:blipFill>
-                <a:blip r:embed="rId7"/>
-                <a:stretch>
-                  <a:fillRect l="-3556" t="-4717" b="-14151"/>
-                </a:stretch>
-              </a:blipFill>
-            </p:spPr>
-            <p:txBody>
-              <a:bodyPr/>
-              <a:lstStyle/>
-              <a:p>
-                <a:r>
-                  <a:rPr lang="he-IL">
-                    <a:noFill/>
-                  </a:rPr>
-                  <a:t> </a:t>
-                </a:r>
-              </a:p>
-            </p:txBody>
-          </p:sp>
-        </mc:Fallback>
-      </mc:AlternateContent>
-    </p:spTree>
-    <p:extLst>
-      <p:ext uri="{BB962C8B-B14F-4D97-AF65-F5344CB8AC3E}">
-        <p14:creationId xmlns:p14="http://schemas.microsoft.com/office/powerpoint/2010/main" val="3692877893"/>
-      </p:ext>
-    </p:extLst>
-  </p:cSld>
-  <p:clrMapOvr>
-    <a:masterClrMapping/>
-  </p:clrMapOvr>
-</p:sld>
-</file>
-
-<file path=ppt/slides/slide9.xml><?xml version="1.0" encoding="utf-8"?>
-<p:sld xmlns:a="http://schemas.openxmlformats.org/drawingml/2006/main" xmlns:r="http://schemas.openxmlformats.org/officeDocument/2006/relationships" xmlns:p="http://schemas.openxmlformats.org/presentationml/2006/main">
-  <p:cSld>
-    <p:spTree>
-      <p:nvGrpSpPr>
-        <p:cNvPr id="1" name=""/>
-        <p:cNvGrpSpPr/>
-        <p:nvPr/>
-      </p:nvGrpSpPr>
-      <p:grpSpPr>
-        <a:xfrm>
-          <a:off x="0" y="0"/>
-          <a:ext cx="0" cy="0"/>
-          <a:chOff x="0" y="0"/>
-          <a:chExt cx="0" cy="0"/>
-        </a:xfrm>
-      </p:grpSpPr>
-      <p:grpSp>
-        <p:nvGrpSpPr>
           <p:cNvPr id="16" name="Group 15">
             <a:extLst>
               <a:ext uri="{FF2B5EF4-FFF2-40B4-BE49-F238E27FC236}">
@@ -23692,8 +21999,8 @@
             </a:p>
           </p:txBody>
         </p:sp>
-        <mc:AlternateContent xmlns:mc="http://schemas.openxmlformats.org/markup-compatibility/2006">
-          <mc:Choice xmlns:a14="http://schemas.microsoft.com/office/drawing/2010/main" Requires="a14">
+        <mc:AlternateContent xmlns:mc="http://schemas.openxmlformats.org/markup-compatibility/2006" xmlns:a14="http://schemas.microsoft.com/office/drawing/2010/main">
+          <mc:Choice Requires="a14">
             <p:sp>
               <p:nvSpPr>
                 <p:cNvPr id="126" name="Oval 125">
@@ -23768,7 +22075,7 @@
               </p:txBody>
             </p:sp>
           </mc:Choice>
-          <mc:Fallback>
+          <mc:Fallback xmlns="">
             <p:sp>
               <p:nvSpPr>
                 <p:cNvPr id="126" name="Oval 125">
@@ -25215,6 +23522,1565 @@
     <p:extLst>
       <p:ext uri="{BB962C8B-B14F-4D97-AF65-F5344CB8AC3E}">
         <p14:creationId xmlns:p14="http://schemas.microsoft.com/office/powerpoint/2010/main" val="2128170757"/>
+      </p:ext>
+    </p:extLst>
+  </p:cSld>
+  <p:clrMapOvr>
+    <a:masterClrMapping/>
+  </p:clrMapOvr>
+</p:sld>
+</file>
+
+<file path=ppt/slides/slide9.xml><?xml version="1.0" encoding="utf-8"?>
+<p:sld xmlns:a="http://schemas.openxmlformats.org/drawingml/2006/main" xmlns:r="http://schemas.openxmlformats.org/officeDocument/2006/relationships" xmlns:p="http://schemas.openxmlformats.org/presentationml/2006/main">
+  <p:cSld>
+    <p:spTree>
+      <p:nvGrpSpPr>
+        <p:cNvPr id="1" name=""/>
+        <p:cNvGrpSpPr/>
+        <p:nvPr/>
+      </p:nvGrpSpPr>
+      <p:grpSpPr>
+        <a:xfrm>
+          <a:off x="0" y="0"/>
+          <a:ext cx="0" cy="0"/>
+          <a:chOff x="0" y="0"/>
+          <a:chExt cx="0" cy="0"/>
+        </a:xfrm>
+      </p:grpSpPr>
+      <p:grpSp>
+        <p:nvGrpSpPr>
+          <p:cNvPr id="113" name="Group 112">
+            <a:extLst>
+              <a:ext uri="{FF2B5EF4-FFF2-40B4-BE49-F238E27FC236}">
+                <a16:creationId xmlns:a16="http://schemas.microsoft.com/office/drawing/2014/main" id="{46072241-626A-4116-9D5F-45C071DECAAB}"/>
+              </a:ext>
+            </a:extLst>
+          </p:cNvPr>
+          <p:cNvGrpSpPr/>
+          <p:nvPr/>
+        </p:nvGrpSpPr>
+        <p:grpSpPr>
+          <a:xfrm>
+            <a:off x="1487592" y="1083325"/>
+            <a:ext cx="9216816" cy="4691350"/>
+            <a:chOff x="1487592" y="1083325"/>
+            <a:chExt cx="9216816" cy="4691350"/>
+          </a:xfrm>
+        </p:grpSpPr>
+        <p:grpSp>
+          <p:nvGrpSpPr>
+            <p:cNvPr id="111" name="Group 110">
+              <a:extLst>
+                <a:ext uri="{FF2B5EF4-FFF2-40B4-BE49-F238E27FC236}">
+                  <a16:creationId xmlns:a16="http://schemas.microsoft.com/office/drawing/2014/main" id="{AA419B5D-7D5B-46E3-A210-81E44968CB4E}"/>
+                </a:ext>
+              </a:extLst>
+            </p:cNvPr>
+            <p:cNvGrpSpPr/>
+            <p:nvPr/>
+          </p:nvGrpSpPr>
+          <p:grpSpPr>
+            <a:xfrm>
+              <a:off x="1487592" y="1083325"/>
+              <a:ext cx="9216816" cy="4691350"/>
+              <a:chOff x="2820647" y="676703"/>
+              <a:chExt cx="9216816" cy="4691350"/>
+            </a:xfrm>
+          </p:grpSpPr>
+          <p:sp>
+            <p:nvSpPr>
+              <p:cNvPr id="2" name="Isosceles Triangle 1">
+                <a:extLst>
+                  <a:ext uri="{FF2B5EF4-FFF2-40B4-BE49-F238E27FC236}">
+                    <a16:creationId xmlns:a16="http://schemas.microsoft.com/office/drawing/2014/main" id="{6A11F797-F563-4CDE-8C3F-0450B16EF178}"/>
+                  </a:ext>
+                </a:extLst>
+              </p:cNvPr>
+              <p:cNvSpPr/>
+              <p:nvPr/>
+            </p:nvSpPr>
+            <p:spPr>
+              <a:xfrm>
+                <a:off x="5587738" y="754144"/>
+                <a:ext cx="685800" cy="548640"/>
+              </a:xfrm>
+              <a:prstGeom prst="triangle">
+                <a:avLst/>
+              </a:prstGeom>
+              <a:solidFill>
+                <a:srgbClr val="0070C0"/>
+              </a:solidFill>
+              <a:ln w="25400">
+                <a:solidFill>
+                  <a:schemeClr val="tx1"/>
+                </a:solidFill>
+              </a:ln>
+            </p:spPr>
+            <p:style>
+              <a:lnRef idx="2">
+                <a:schemeClr val="accent1">
+                  <a:shade val="50000"/>
+                </a:schemeClr>
+              </a:lnRef>
+              <a:fillRef idx="1">
+                <a:schemeClr val="accent1"/>
+              </a:fillRef>
+              <a:effectRef idx="0">
+                <a:schemeClr val="accent1"/>
+              </a:effectRef>
+              <a:fontRef idx="minor">
+                <a:schemeClr val="lt1"/>
+              </a:fontRef>
+            </p:style>
+            <p:txBody>
+              <a:bodyPr rtlCol="1" anchor="ctr"/>
+              <a:lstStyle/>
+              <a:p>
+                <a:pPr algn="ctr"/>
+                <a:endParaRPr lang="he-IL"/>
+              </a:p>
+            </p:txBody>
+          </p:sp>
+          <p:sp>
+            <p:nvSpPr>
+              <p:cNvPr id="50" name="Isosceles Triangle 49">
+                <a:extLst>
+                  <a:ext uri="{FF2B5EF4-FFF2-40B4-BE49-F238E27FC236}">
+                    <a16:creationId xmlns:a16="http://schemas.microsoft.com/office/drawing/2014/main" id="{44CACD17-EB4B-487B-BF6B-026BCC73B346}"/>
+                  </a:ext>
+                </a:extLst>
+              </p:cNvPr>
+              <p:cNvSpPr/>
+              <p:nvPr/>
+            </p:nvSpPr>
+            <p:spPr>
+              <a:xfrm rot="10800000">
+                <a:off x="7799001" y="2042208"/>
+                <a:ext cx="685800" cy="548640"/>
+              </a:xfrm>
+              <a:prstGeom prst="triangle">
+                <a:avLst/>
+              </a:prstGeom>
+              <a:solidFill>
+                <a:srgbClr val="FF0000"/>
+              </a:solidFill>
+              <a:ln w="25400">
+                <a:solidFill>
+                  <a:schemeClr val="tx1"/>
+                </a:solidFill>
+              </a:ln>
+            </p:spPr>
+            <p:style>
+              <a:lnRef idx="2">
+                <a:schemeClr val="accent1">
+                  <a:shade val="50000"/>
+                </a:schemeClr>
+              </a:lnRef>
+              <a:fillRef idx="1">
+                <a:schemeClr val="accent1"/>
+              </a:fillRef>
+              <a:effectRef idx="0">
+                <a:schemeClr val="accent1"/>
+              </a:effectRef>
+              <a:fontRef idx="minor">
+                <a:schemeClr val="lt1"/>
+              </a:fontRef>
+            </p:style>
+            <p:txBody>
+              <a:bodyPr rtlCol="1" anchor="ctr"/>
+              <a:lstStyle/>
+              <a:p>
+                <a:pPr algn="ctr"/>
+                <a:endParaRPr lang="he-IL"/>
+              </a:p>
+            </p:txBody>
+          </p:sp>
+          <p:sp>
+            <p:nvSpPr>
+              <p:cNvPr id="52" name="Rectangle 51">
+                <a:extLst>
+                  <a:ext uri="{FF2B5EF4-FFF2-40B4-BE49-F238E27FC236}">
+                    <a16:creationId xmlns:a16="http://schemas.microsoft.com/office/drawing/2014/main" id="{333E295C-4C95-4C9A-98EB-A973C6E40A78}"/>
+                  </a:ext>
+                </a:extLst>
+              </p:cNvPr>
+              <p:cNvSpPr/>
+              <p:nvPr/>
+            </p:nvSpPr>
+            <p:spPr>
+              <a:xfrm>
+                <a:off x="6637612" y="4312921"/>
+                <a:ext cx="685800" cy="685800"/>
+              </a:xfrm>
+              <a:prstGeom prst="rect">
+                <a:avLst/>
+              </a:prstGeom>
+              <a:ln w="25400">
+                <a:solidFill>
+                  <a:schemeClr val="tx1"/>
+                </a:solidFill>
+              </a:ln>
+            </p:spPr>
+            <p:style>
+              <a:lnRef idx="2">
+                <a:schemeClr val="accent1">
+                  <a:shade val="50000"/>
+                </a:schemeClr>
+              </a:lnRef>
+              <a:fillRef idx="1">
+                <a:schemeClr val="accent1"/>
+              </a:fillRef>
+              <a:effectRef idx="0">
+                <a:schemeClr val="accent1"/>
+              </a:effectRef>
+              <a:fontRef idx="minor">
+                <a:schemeClr val="lt1"/>
+              </a:fontRef>
+            </p:style>
+            <p:txBody>
+              <a:bodyPr rtlCol="1" anchor="ctr"/>
+              <a:lstStyle/>
+              <a:p>
+                <a:pPr algn="ctr"/>
+                <a:endParaRPr lang="he-IL"/>
+              </a:p>
+            </p:txBody>
+          </p:sp>
+          <p:cxnSp>
+            <p:nvCxnSpPr>
+              <p:cNvPr id="5" name="Straight Connector 4">
+                <a:extLst>
+                  <a:ext uri="{FF2B5EF4-FFF2-40B4-BE49-F238E27FC236}">
+                    <a16:creationId xmlns:a16="http://schemas.microsoft.com/office/drawing/2014/main" id="{1925075F-8821-4439-8E38-6B77B1535AB1}"/>
+                  </a:ext>
+                </a:extLst>
+              </p:cNvPr>
+              <p:cNvCxnSpPr>
+                <a:cxnSpLocks/>
+                <a:stCxn id="2" idx="2"/>
+              </p:cNvCxnSpPr>
+              <p:nvPr/>
+            </p:nvCxnSpPr>
+            <p:spPr>
+              <a:xfrm flipH="1">
+                <a:off x="3619988" y="1302784"/>
+                <a:ext cx="1967750" cy="632673"/>
+              </a:xfrm>
+              <a:prstGeom prst="line">
+                <a:avLst/>
+              </a:prstGeom>
+              <a:ln w="25400">
+                <a:solidFill>
+                  <a:schemeClr val="tx1"/>
+                </a:solidFill>
+                <a:tailEnd type="none"/>
+              </a:ln>
+            </p:spPr>
+            <p:style>
+              <a:lnRef idx="1">
+                <a:schemeClr val="accent1"/>
+              </a:lnRef>
+              <a:fillRef idx="0">
+                <a:schemeClr val="accent1"/>
+              </a:fillRef>
+              <a:effectRef idx="0">
+                <a:schemeClr val="accent1"/>
+              </a:effectRef>
+              <a:fontRef idx="minor">
+                <a:schemeClr val="tx1"/>
+              </a:fontRef>
+            </p:style>
+          </p:cxnSp>
+          <p:cxnSp>
+            <p:nvCxnSpPr>
+              <p:cNvPr id="55" name="Straight Connector 54">
+                <a:extLst>
+                  <a:ext uri="{FF2B5EF4-FFF2-40B4-BE49-F238E27FC236}">
+                    <a16:creationId xmlns:a16="http://schemas.microsoft.com/office/drawing/2014/main" id="{84A9E243-4E39-4807-BFB4-F7E80E7237F7}"/>
+                  </a:ext>
+                </a:extLst>
+              </p:cNvPr>
+              <p:cNvCxnSpPr>
+                <a:cxnSpLocks/>
+                <a:stCxn id="2" idx="4"/>
+                <a:endCxn id="50" idx="3"/>
+              </p:cNvCxnSpPr>
+              <p:nvPr/>
+            </p:nvCxnSpPr>
+            <p:spPr>
+              <a:xfrm>
+                <a:off x="6273538" y="1302784"/>
+                <a:ext cx="1868363" cy="739424"/>
+              </a:xfrm>
+              <a:prstGeom prst="line">
+                <a:avLst/>
+              </a:prstGeom>
+              <a:ln w="25400">
+                <a:solidFill>
+                  <a:schemeClr val="tx1"/>
+                </a:solidFill>
+                <a:headEnd type="none"/>
+                <a:tailEnd type="none"/>
+              </a:ln>
+            </p:spPr>
+            <p:style>
+              <a:lnRef idx="1">
+                <a:schemeClr val="accent1"/>
+              </a:lnRef>
+              <a:fillRef idx="0">
+                <a:schemeClr val="accent1"/>
+              </a:fillRef>
+              <a:effectRef idx="0">
+                <a:schemeClr val="accent1"/>
+              </a:effectRef>
+              <a:fontRef idx="minor">
+                <a:schemeClr val="tx1"/>
+              </a:fontRef>
+            </p:style>
+          </p:cxnSp>
+          <p:cxnSp>
+            <p:nvCxnSpPr>
+              <p:cNvPr id="64" name="Straight Connector 63">
+                <a:extLst>
+                  <a:ext uri="{FF2B5EF4-FFF2-40B4-BE49-F238E27FC236}">
+                    <a16:creationId xmlns:a16="http://schemas.microsoft.com/office/drawing/2014/main" id="{ABEE147E-B2E7-4C16-8B2B-6E1EFDBD6567}"/>
+                  </a:ext>
+                </a:extLst>
+              </p:cNvPr>
+              <p:cNvCxnSpPr>
+                <a:cxnSpLocks/>
+                <a:stCxn id="44" idx="0"/>
+                <a:endCxn id="50" idx="5"/>
+              </p:cNvCxnSpPr>
+              <p:nvPr/>
+            </p:nvCxnSpPr>
+            <p:spPr>
+              <a:xfrm flipV="1">
+                <a:off x="6980512" y="2316528"/>
+                <a:ext cx="989939" cy="702540"/>
+              </a:xfrm>
+              <a:prstGeom prst="line">
+                <a:avLst/>
+              </a:prstGeom>
+              <a:ln w="25400">
+                <a:solidFill>
+                  <a:schemeClr val="tx1"/>
+                </a:solidFill>
+                <a:headEnd type="none"/>
+              </a:ln>
+            </p:spPr>
+            <p:style>
+              <a:lnRef idx="1">
+                <a:schemeClr val="accent1"/>
+              </a:lnRef>
+              <a:fillRef idx="0">
+                <a:schemeClr val="accent1"/>
+              </a:fillRef>
+              <a:effectRef idx="0">
+                <a:schemeClr val="accent1"/>
+              </a:effectRef>
+              <a:fontRef idx="minor">
+                <a:schemeClr val="tx1"/>
+              </a:fontRef>
+            </p:style>
+          </p:cxnSp>
+          <p:cxnSp>
+            <p:nvCxnSpPr>
+              <p:cNvPr id="67" name="Straight Connector 66">
+                <a:extLst>
+                  <a:ext uri="{FF2B5EF4-FFF2-40B4-BE49-F238E27FC236}">
+                    <a16:creationId xmlns:a16="http://schemas.microsoft.com/office/drawing/2014/main" id="{85BB5E8E-008A-4BC4-B89A-DF90B4A77FA0}"/>
+                  </a:ext>
+                </a:extLst>
+              </p:cNvPr>
+              <p:cNvCxnSpPr>
+                <a:cxnSpLocks/>
+                <a:endCxn id="50" idx="1"/>
+              </p:cNvCxnSpPr>
+              <p:nvPr/>
+            </p:nvCxnSpPr>
+            <p:spPr>
+              <a:xfrm flipH="1" flipV="1">
+                <a:off x="8313351" y="2316528"/>
+                <a:ext cx="980802" cy="665498"/>
+              </a:xfrm>
+              <a:prstGeom prst="line">
+                <a:avLst/>
+              </a:prstGeom>
+              <a:ln w="25400">
+                <a:solidFill>
+                  <a:schemeClr val="tx1"/>
+                </a:solidFill>
+                <a:headEnd type="none"/>
+                <a:tailEnd type="none"/>
+              </a:ln>
+            </p:spPr>
+            <p:style>
+              <a:lnRef idx="1">
+                <a:schemeClr val="accent1"/>
+              </a:lnRef>
+              <a:fillRef idx="0">
+                <a:schemeClr val="accent1"/>
+              </a:fillRef>
+              <a:effectRef idx="0">
+                <a:schemeClr val="accent1"/>
+              </a:effectRef>
+              <a:fontRef idx="minor">
+                <a:schemeClr val="tx1"/>
+              </a:fontRef>
+            </p:style>
+          </p:cxnSp>
+          <p:sp>
+            <p:nvSpPr>
+              <p:cNvPr id="19" name="TextBox 18">
+                <a:extLst>
+                  <a:ext uri="{FF2B5EF4-FFF2-40B4-BE49-F238E27FC236}">
+                    <a16:creationId xmlns:a16="http://schemas.microsoft.com/office/drawing/2014/main" id="{F5D4EAF9-6850-439D-A061-9416AB5D49B7}"/>
+                  </a:ext>
+                </a:extLst>
+              </p:cNvPr>
+              <p:cNvSpPr txBox="1"/>
+              <p:nvPr/>
+            </p:nvSpPr>
+            <p:spPr>
+              <a:xfrm>
+                <a:off x="10923322" y="2360120"/>
+                <a:ext cx="1114141" cy="369332"/>
+              </a:xfrm>
+              <a:prstGeom prst="rect">
+                <a:avLst/>
+              </a:prstGeom>
+              <a:noFill/>
+            </p:spPr>
+            <p:txBody>
+              <a:bodyPr wrap="square" rtlCol="1">
+                <a:spAutoFit/>
+              </a:bodyPr>
+              <a:lstStyle/>
+              <a:p>
+                <a:r>
+                  <a:rPr lang="en-US" dirty="0">
+                    <a:latin typeface="David" panose="020E0502060401010101" pitchFamily="34" charset="-79"/>
+                    <a:cs typeface="David" panose="020E0502060401010101" pitchFamily="34" charset="-79"/>
+                  </a:rPr>
+                  <a:t>LEAF</a:t>
+                </a:r>
+                <a:endParaRPr lang="he-IL" dirty="0">
+                  <a:latin typeface="David" panose="020E0502060401010101" pitchFamily="34" charset="-79"/>
+                  <a:cs typeface="David" panose="020E0502060401010101" pitchFamily="34" charset="-79"/>
+                </a:endParaRPr>
+              </a:p>
+            </p:txBody>
+          </p:sp>
+          <p:sp>
+            <p:nvSpPr>
+              <p:cNvPr id="79" name="TextBox 78">
+                <a:extLst>
+                  <a:ext uri="{FF2B5EF4-FFF2-40B4-BE49-F238E27FC236}">
+                    <a16:creationId xmlns:a16="http://schemas.microsoft.com/office/drawing/2014/main" id="{6E0BEF9F-9D59-4EB7-8CA3-CD5F7CB75F72}"/>
+                  </a:ext>
+                </a:extLst>
+              </p:cNvPr>
+              <p:cNvSpPr txBox="1"/>
+              <p:nvPr/>
+            </p:nvSpPr>
+            <p:spPr>
+              <a:xfrm>
+                <a:off x="10923322" y="1491722"/>
+                <a:ext cx="1114141" cy="369332"/>
+              </a:xfrm>
+              <a:prstGeom prst="rect">
+                <a:avLst/>
+              </a:prstGeom>
+              <a:noFill/>
+            </p:spPr>
+            <p:txBody>
+              <a:bodyPr wrap="square" rtlCol="1">
+                <a:spAutoFit/>
+              </a:bodyPr>
+              <a:lstStyle/>
+              <a:p>
+                <a:r>
+                  <a:rPr lang="en-US" dirty="0">
+                    <a:latin typeface="David" panose="020E0502060401010101" pitchFamily="34" charset="-79"/>
+                    <a:cs typeface="David" panose="020E0502060401010101" pitchFamily="34" charset="-79"/>
+                  </a:rPr>
+                  <a:t>MIN</a:t>
+                </a:r>
+                <a:endParaRPr lang="he-IL" dirty="0">
+                  <a:latin typeface="David" panose="020E0502060401010101" pitchFamily="34" charset="-79"/>
+                  <a:cs typeface="David" panose="020E0502060401010101" pitchFamily="34" charset="-79"/>
+                </a:endParaRPr>
+              </a:p>
+            </p:txBody>
+          </p:sp>
+          <p:sp>
+            <p:nvSpPr>
+              <p:cNvPr id="83" name="Isosceles Triangle 82">
+                <a:extLst>
+                  <a:ext uri="{FF2B5EF4-FFF2-40B4-BE49-F238E27FC236}">
+                    <a16:creationId xmlns:a16="http://schemas.microsoft.com/office/drawing/2014/main" id="{4FAC92D0-6C15-4479-B0F0-5E4B4CEADFA3}"/>
+                  </a:ext>
+                </a:extLst>
+              </p:cNvPr>
+              <p:cNvSpPr/>
+              <p:nvPr/>
+            </p:nvSpPr>
+            <p:spPr>
+              <a:xfrm>
+                <a:off x="10034529" y="676703"/>
+                <a:ext cx="685800" cy="548640"/>
+              </a:xfrm>
+              <a:prstGeom prst="triangle">
+                <a:avLst/>
+              </a:prstGeom>
+              <a:solidFill>
+                <a:srgbClr val="0070C0"/>
+              </a:solidFill>
+              <a:ln w="25400">
+                <a:solidFill>
+                  <a:schemeClr val="tx1"/>
+                </a:solidFill>
+              </a:ln>
+            </p:spPr>
+            <p:style>
+              <a:lnRef idx="2">
+                <a:schemeClr val="accent1">
+                  <a:shade val="50000"/>
+                </a:schemeClr>
+              </a:lnRef>
+              <a:fillRef idx="1">
+                <a:schemeClr val="accent1"/>
+              </a:fillRef>
+              <a:effectRef idx="0">
+                <a:schemeClr val="accent1"/>
+              </a:effectRef>
+              <a:fontRef idx="minor">
+                <a:schemeClr val="lt1"/>
+              </a:fontRef>
+            </p:style>
+            <p:txBody>
+              <a:bodyPr rtlCol="1" anchor="ctr"/>
+              <a:lstStyle/>
+              <a:p>
+                <a:pPr algn="ctr"/>
+                <a:endParaRPr lang="he-IL"/>
+              </a:p>
+            </p:txBody>
+          </p:sp>
+          <p:sp>
+            <p:nvSpPr>
+              <p:cNvPr id="85" name="Isosceles Triangle 84">
+                <a:extLst>
+                  <a:ext uri="{FF2B5EF4-FFF2-40B4-BE49-F238E27FC236}">
+                    <a16:creationId xmlns:a16="http://schemas.microsoft.com/office/drawing/2014/main" id="{793C3994-8A68-4663-960C-3CF9EE5F7F2A}"/>
+                  </a:ext>
+                </a:extLst>
+              </p:cNvPr>
+              <p:cNvSpPr/>
+              <p:nvPr/>
+            </p:nvSpPr>
+            <p:spPr>
+              <a:xfrm rot="10800000">
+                <a:off x="10034529" y="1493567"/>
+                <a:ext cx="685800" cy="548640"/>
+              </a:xfrm>
+              <a:prstGeom prst="triangle">
+                <a:avLst/>
+              </a:prstGeom>
+              <a:solidFill>
+                <a:srgbClr val="FF0000"/>
+              </a:solidFill>
+              <a:ln w="25400">
+                <a:solidFill>
+                  <a:schemeClr val="tx1"/>
+                </a:solidFill>
+              </a:ln>
+            </p:spPr>
+            <p:style>
+              <a:lnRef idx="2">
+                <a:schemeClr val="accent1">
+                  <a:shade val="50000"/>
+                </a:schemeClr>
+              </a:lnRef>
+              <a:fillRef idx="1">
+                <a:schemeClr val="accent1"/>
+              </a:fillRef>
+              <a:effectRef idx="0">
+                <a:schemeClr val="accent1"/>
+              </a:effectRef>
+              <a:fontRef idx="minor">
+                <a:schemeClr val="lt1"/>
+              </a:fontRef>
+            </p:style>
+            <p:txBody>
+              <a:bodyPr rtlCol="1" anchor="ctr"/>
+              <a:lstStyle/>
+              <a:p>
+                <a:pPr algn="ctr"/>
+                <a:endParaRPr lang="he-IL"/>
+              </a:p>
+            </p:txBody>
+          </p:sp>
+          <p:sp>
+            <p:nvSpPr>
+              <p:cNvPr id="86" name="Rectangle 85">
+                <a:extLst>
+                  <a:ext uri="{FF2B5EF4-FFF2-40B4-BE49-F238E27FC236}">
+                    <a16:creationId xmlns:a16="http://schemas.microsoft.com/office/drawing/2014/main" id="{A02E479A-0575-4438-A0FC-797389076E2B}"/>
+                  </a:ext>
+                </a:extLst>
+              </p:cNvPr>
+              <p:cNvSpPr/>
+              <p:nvPr/>
+            </p:nvSpPr>
+            <p:spPr>
+              <a:xfrm>
+                <a:off x="10034529" y="2271877"/>
+                <a:ext cx="685800" cy="685800"/>
+              </a:xfrm>
+              <a:prstGeom prst="rect">
+                <a:avLst/>
+              </a:prstGeom>
+              <a:ln w="25400">
+                <a:solidFill>
+                  <a:schemeClr val="tx1"/>
+                </a:solidFill>
+              </a:ln>
+            </p:spPr>
+            <p:style>
+              <a:lnRef idx="2">
+                <a:schemeClr val="accent1">
+                  <a:shade val="50000"/>
+                </a:schemeClr>
+              </a:lnRef>
+              <a:fillRef idx="1">
+                <a:schemeClr val="accent1"/>
+              </a:fillRef>
+              <a:effectRef idx="0">
+                <a:schemeClr val="accent1"/>
+              </a:effectRef>
+              <a:fontRef idx="minor">
+                <a:schemeClr val="lt1"/>
+              </a:fontRef>
+            </p:style>
+            <p:txBody>
+              <a:bodyPr rtlCol="1" anchor="ctr"/>
+              <a:lstStyle/>
+              <a:p>
+                <a:pPr algn="ctr"/>
+                <a:endParaRPr lang="he-IL"/>
+              </a:p>
+            </p:txBody>
+          </p:sp>
+          <p:sp>
+            <p:nvSpPr>
+              <p:cNvPr id="87" name="TextBox 86">
+                <a:extLst>
+                  <a:ext uri="{FF2B5EF4-FFF2-40B4-BE49-F238E27FC236}">
+                    <a16:creationId xmlns:a16="http://schemas.microsoft.com/office/drawing/2014/main" id="{BC4A4F4A-1FFE-4D8B-AEB9-DC2FA23CAF10}"/>
+                  </a:ext>
+                </a:extLst>
+              </p:cNvPr>
+              <p:cNvSpPr txBox="1"/>
+              <p:nvPr/>
+            </p:nvSpPr>
+            <p:spPr>
+              <a:xfrm>
+                <a:off x="10923322" y="766357"/>
+                <a:ext cx="1114141" cy="369332"/>
+              </a:xfrm>
+              <a:prstGeom prst="rect">
+                <a:avLst/>
+              </a:prstGeom>
+              <a:noFill/>
+            </p:spPr>
+            <p:txBody>
+              <a:bodyPr wrap="square" rtlCol="1">
+                <a:spAutoFit/>
+              </a:bodyPr>
+              <a:lstStyle/>
+              <a:p>
+                <a:r>
+                  <a:rPr lang="en-US" dirty="0">
+                    <a:latin typeface="David" panose="020E0502060401010101" pitchFamily="34" charset="-79"/>
+                    <a:cs typeface="David" panose="020E0502060401010101" pitchFamily="34" charset="-79"/>
+                  </a:rPr>
+                  <a:t>MAX</a:t>
+                </a:r>
+                <a:endParaRPr lang="he-IL" dirty="0">
+                  <a:latin typeface="David" panose="020E0502060401010101" pitchFamily="34" charset="-79"/>
+                  <a:cs typeface="David" panose="020E0502060401010101" pitchFamily="34" charset="-79"/>
+                </a:endParaRPr>
+              </a:p>
+            </p:txBody>
+          </p:sp>
+          <mc:AlternateContent xmlns:mc="http://schemas.openxmlformats.org/markup-compatibility/2006">
+            <mc:Choice xmlns:a14="http://schemas.microsoft.com/office/drawing/2010/main" Requires="a14">
+              <p:sp>
+                <p:nvSpPr>
+                  <p:cNvPr id="32" name="TextBox 31">
+                    <a:extLst>
+                      <a:ext uri="{FF2B5EF4-FFF2-40B4-BE49-F238E27FC236}">
+                        <a16:creationId xmlns:a16="http://schemas.microsoft.com/office/drawing/2014/main" id="{4AC0FB76-6D95-4D05-987D-60D0669D9F93}"/>
+                      </a:ext>
+                    </a:extLst>
+                  </p:cNvPr>
+                  <p:cNvSpPr txBox="1"/>
+                  <p:nvPr/>
+                </p:nvSpPr>
+                <p:spPr>
+                  <a:xfrm>
+                    <a:off x="6404573" y="696313"/>
+                    <a:ext cx="1371600" cy="646331"/>
+                  </a:xfrm>
+                  <a:prstGeom prst="rect">
+                    <a:avLst/>
+                  </a:prstGeom>
+                  <a:noFill/>
+                </p:spPr>
+                <p:txBody>
+                  <a:bodyPr wrap="square" rtlCol="1">
+                    <a:spAutoFit/>
+                  </a:bodyPr>
+                  <a:lstStyle/>
+                  <a:p>
+                    <a:r>
+                      <a:rPr lang="en-US" b="0" dirty="0">
+                        <a:latin typeface="David" panose="020E0502060401010101" pitchFamily="34" charset="-79"/>
+                        <a:cs typeface="David" panose="020E0502060401010101" pitchFamily="34" charset="-79"/>
+                      </a:rPr>
+                      <a:t>Alpha:6</a:t>
+                    </a:r>
+                  </a:p>
+                  <a:p>
+                    <a:r>
+                      <a:rPr lang="en-US" dirty="0">
+                        <a:latin typeface="David" panose="020E0502060401010101" pitchFamily="34" charset="-79"/>
+                        <a:cs typeface="David" panose="020E0502060401010101" pitchFamily="34" charset="-79"/>
+                      </a:rPr>
+                      <a:t>Beta:</a:t>
+                    </a:r>
+                    <a14:m>
+                      <m:oMath xmlns:m="http://schemas.openxmlformats.org/officeDocument/2006/math">
+                        <m:r>
+                          <a:rPr lang="en-US" b="0" i="1" dirty="0" smtClean="0">
+                            <a:latin typeface="Cambria Math" panose="02040503050406030204" pitchFamily="18" charset="0"/>
+                            <a:ea typeface="Cambria Math" panose="02040503050406030204" pitchFamily="18" charset="0"/>
+                            <a:cs typeface="David" panose="020E0502060401010101" pitchFamily="34" charset="-79"/>
+                          </a:rPr>
+                          <m:t>∞</m:t>
+                        </m:r>
+                      </m:oMath>
+                    </a14:m>
+                    <a:endParaRPr lang="en-US" b="0" dirty="0">
+                      <a:latin typeface="David" panose="020E0502060401010101" pitchFamily="34" charset="-79"/>
+                      <a:cs typeface="David" panose="020E0502060401010101" pitchFamily="34" charset="-79"/>
+                    </a:endParaRPr>
+                  </a:p>
+                </p:txBody>
+              </p:sp>
+            </mc:Choice>
+            <mc:Fallback>
+              <p:sp>
+                <p:nvSpPr>
+                  <p:cNvPr id="32" name="TextBox 31">
+                    <a:extLst>
+                      <a:ext uri="{FF2B5EF4-FFF2-40B4-BE49-F238E27FC236}">
+                        <a16:creationId xmlns:a16="http://schemas.microsoft.com/office/drawing/2014/main" id="{4AC0FB76-6D95-4D05-987D-60D0669D9F93}"/>
+                      </a:ext>
+                    </a:extLst>
+                  </p:cNvPr>
+                  <p:cNvSpPr txBox="1">
+                    <a:spLocks noRot="1" noChangeAspect="1" noMove="1" noResize="1" noEditPoints="1" noAdjustHandles="1" noChangeArrowheads="1" noChangeShapeType="1" noTextEdit="1"/>
+                  </p:cNvSpPr>
+                  <p:nvPr/>
+                </p:nvSpPr>
+                <p:spPr>
+                  <a:xfrm>
+                    <a:off x="6404573" y="696313"/>
+                    <a:ext cx="1371600" cy="646331"/>
+                  </a:xfrm>
+                  <a:prstGeom prst="rect">
+                    <a:avLst/>
+                  </a:prstGeom>
+                  <a:blipFill>
+                    <a:blip r:embed="rId2"/>
+                    <a:stretch>
+                      <a:fillRect l="-4000" t="-5660" b="-14151"/>
+                    </a:stretch>
+                  </a:blipFill>
+                </p:spPr>
+                <p:txBody>
+                  <a:bodyPr/>
+                  <a:lstStyle/>
+                  <a:p>
+                    <a:r>
+                      <a:rPr lang="he-IL">
+                        <a:noFill/>
+                      </a:rPr>
+                      <a:t> </a:t>
+                    </a:r>
+                  </a:p>
+                </p:txBody>
+              </p:sp>
+            </mc:Fallback>
+          </mc:AlternateContent>
+          <p:sp>
+            <p:nvSpPr>
+              <p:cNvPr id="28" name="TextBox 27">
+                <a:extLst>
+                  <a:ext uri="{FF2B5EF4-FFF2-40B4-BE49-F238E27FC236}">
+                    <a16:creationId xmlns:a16="http://schemas.microsoft.com/office/drawing/2014/main" id="{1D14802D-4425-48EB-8356-0DECD2D03464}"/>
+                  </a:ext>
+                </a:extLst>
+              </p:cNvPr>
+              <p:cNvSpPr txBox="1"/>
+              <p:nvPr/>
+            </p:nvSpPr>
+            <p:spPr>
+              <a:xfrm>
+                <a:off x="8539377" y="1857706"/>
+                <a:ext cx="1371600" cy="646331"/>
+              </a:xfrm>
+              <a:prstGeom prst="rect">
+                <a:avLst/>
+              </a:prstGeom>
+              <a:noFill/>
+            </p:spPr>
+            <p:txBody>
+              <a:bodyPr wrap="square" rtlCol="1">
+                <a:spAutoFit/>
+              </a:bodyPr>
+              <a:lstStyle/>
+              <a:p>
+                <a:r>
+                  <a:rPr lang="en-US" b="0" dirty="0">
+                    <a:latin typeface="David" panose="020E0502060401010101" pitchFamily="34" charset="-79"/>
+                    <a:cs typeface="David" panose="020E0502060401010101" pitchFamily="34" charset="-79"/>
+                  </a:rPr>
+                  <a:t>Alpha:6</a:t>
+                </a:r>
+              </a:p>
+              <a:p>
+                <a:r>
+                  <a:rPr lang="en-US" dirty="0">
+                    <a:latin typeface="David" panose="020E0502060401010101" pitchFamily="34" charset="-79"/>
+                    <a:cs typeface="David" panose="020E0502060401010101" pitchFamily="34" charset="-79"/>
+                  </a:rPr>
+                  <a:t>Beta:6</a:t>
+                </a:r>
+                <a:endParaRPr lang="en-US" b="0" dirty="0">
+                  <a:latin typeface="David" panose="020E0502060401010101" pitchFamily="34" charset="-79"/>
+                  <a:cs typeface="David" panose="020E0502060401010101" pitchFamily="34" charset="-79"/>
+                </a:endParaRPr>
+              </a:p>
+            </p:txBody>
+          </p:sp>
+          <p:cxnSp>
+            <p:nvCxnSpPr>
+              <p:cNvPr id="30" name="Straight Connector 29">
+                <a:extLst>
+                  <a:ext uri="{FF2B5EF4-FFF2-40B4-BE49-F238E27FC236}">
+                    <a16:creationId xmlns:a16="http://schemas.microsoft.com/office/drawing/2014/main" id="{B1ECC9EA-6A0F-4669-A589-E3645ED152F5}"/>
+                  </a:ext>
+                </a:extLst>
+              </p:cNvPr>
+              <p:cNvCxnSpPr>
+                <a:cxnSpLocks/>
+              </p:cNvCxnSpPr>
+              <p:nvPr/>
+            </p:nvCxnSpPr>
+            <p:spPr>
+              <a:xfrm flipV="1">
+                <a:off x="8595792" y="2429319"/>
+                <a:ext cx="568737" cy="665493"/>
+              </a:xfrm>
+              <a:prstGeom prst="line">
+                <a:avLst/>
+              </a:prstGeom>
+              <a:ln w="63500">
+                <a:solidFill>
+                  <a:srgbClr val="FF0000"/>
+                </a:solidFill>
+              </a:ln>
+            </p:spPr>
+            <p:style>
+              <a:lnRef idx="1">
+                <a:schemeClr val="accent1"/>
+              </a:lnRef>
+              <a:fillRef idx="0">
+                <a:schemeClr val="accent1"/>
+              </a:fillRef>
+              <a:effectRef idx="0">
+                <a:schemeClr val="accent1"/>
+              </a:effectRef>
+              <a:fontRef idx="minor">
+                <a:schemeClr val="tx1"/>
+              </a:fontRef>
+            </p:style>
+          </p:cxnSp>
+          <p:sp>
+            <p:nvSpPr>
+              <p:cNvPr id="44" name="Isosceles Triangle 43">
+                <a:extLst>
+                  <a:ext uri="{FF2B5EF4-FFF2-40B4-BE49-F238E27FC236}">
+                    <a16:creationId xmlns:a16="http://schemas.microsoft.com/office/drawing/2014/main" id="{EB4062B8-B2BC-4645-8054-4F7DA7872922}"/>
+                  </a:ext>
+                </a:extLst>
+              </p:cNvPr>
+              <p:cNvSpPr/>
+              <p:nvPr/>
+            </p:nvSpPr>
+            <p:spPr>
+              <a:xfrm>
+                <a:off x="6637612" y="3019068"/>
+                <a:ext cx="685800" cy="548640"/>
+              </a:xfrm>
+              <a:prstGeom prst="triangle">
+                <a:avLst/>
+              </a:prstGeom>
+              <a:solidFill>
+                <a:srgbClr val="0070C0"/>
+              </a:solidFill>
+              <a:ln w="25400">
+                <a:solidFill>
+                  <a:schemeClr val="tx1"/>
+                </a:solidFill>
+              </a:ln>
+            </p:spPr>
+            <p:style>
+              <a:lnRef idx="2">
+                <a:schemeClr val="accent1">
+                  <a:shade val="50000"/>
+                </a:schemeClr>
+              </a:lnRef>
+              <a:fillRef idx="1">
+                <a:schemeClr val="accent1"/>
+              </a:fillRef>
+              <a:effectRef idx="0">
+                <a:schemeClr val="accent1"/>
+              </a:effectRef>
+              <a:fontRef idx="minor">
+                <a:schemeClr val="lt1"/>
+              </a:fontRef>
+            </p:style>
+            <p:txBody>
+              <a:bodyPr rtlCol="1" anchor="ctr"/>
+              <a:lstStyle/>
+              <a:p>
+                <a:pPr algn="ctr"/>
+                <a:endParaRPr lang="he-IL"/>
+              </a:p>
+            </p:txBody>
+          </p:sp>
+          <p:cxnSp>
+            <p:nvCxnSpPr>
+              <p:cNvPr id="73" name="Straight Connector 72">
+                <a:extLst>
+                  <a:ext uri="{FF2B5EF4-FFF2-40B4-BE49-F238E27FC236}">
+                    <a16:creationId xmlns:a16="http://schemas.microsoft.com/office/drawing/2014/main" id="{1453DA4C-9F08-42E7-93D2-FDA6CC9D103C}"/>
+                  </a:ext>
+                </a:extLst>
+              </p:cNvPr>
+              <p:cNvCxnSpPr>
+                <a:cxnSpLocks/>
+                <a:stCxn id="52" idx="0"/>
+                <a:endCxn id="97" idx="2"/>
+              </p:cNvCxnSpPr>
+              <p:nvPr/>
+            </p:nvCxnSpPr>
+            <p:spPr>
+              <a:xfrm flipH="1" flipV="1">
+                <a:off x="6975727" y="3530666"/>
+                <a:ext cx="4785" cy="782255"/>
+              </a:xfrm>
+              <a:prstGeom prst="line">
+                <a:avLst/>
+              </a:prstGeom>
+              <a:ln w="25400">
+                <a:solidFill>
+                  <a:schemeClr val="tx1"/>
+                </a:solidFill>
+              </a:ln>
+            </p:spPr>
+            <p:style>
+              <a:lnRef idx="1">
+                <a:schemeClr val="accent1"/>
+              </a:lnRef>
+              <a:fillRef idx="0">
+                <a:schemeClr val="accent1"/>
+              </a:fillRef>
+              <a:effectRef idx="0">
+                <a:schemeClr val="accent1"/>
+              </a:effectRef>
+              <a:fontRef idx="minor">
+                <a:schemeClr val="tx1"/>
+              </a:fontRef>
+            </p:style>
+          </p:cxnSp>
+          <mc:AlternateContent xmlns:mc="http://schemas.openxmlformats.org/markup-compatibility/2006">
+            <mc:Choice xmlns:a14="http://schemas.microsoft.com/office/drawing/2010/main" Requires="a14">
+              <p:sp>
+                <p:nvSpPr>
+                  <p:cNvPr id="90" name="TextBox 89">
+                    <a:extLst>
+                      <a:ext uri="{FF2B5EF4-FFF2-40B4-BE49-F238E27FC236}">
+                        <a16:creationId xmlns:a16="http://schemas.microsoft.com/office/drawing/2014/main" id="{F8C9AD82-3C3A-494D-9BA4-A283AEE4C996}"/>
+                      </a:ext>
+                    </a:extLst>
+                  </p:cNvPr>
+                  <p:cNvSpPr txBox="1"/>
+                  <p:nvPr/>
+                </p:nvSpPr>
+                <p:spPr>
+                  <a:xfrm>
+                    <a:off x="6289926" y="4998721"/>
+                    <a:ext cx="1371600" cy="369332"/>
+                  </a:xfrm>
+                  <a:prstGeom prst="rect">
+                    <a:avLst/>
+                  </a:prstGeom>
+                  <a:noFill/>
+                </p:spPr>
+                <p:txBody>
+                  <a:bodyPr wrap="square" rtlCol="1">
+                    <a:spAutoFit/>
+                  </a:bodyPr>
+                  <a:lstStyle/>
+                  <a:p>
+                    <a:pPr/>
+                    <a14:m>
+                      <m:oMathPara xmlns:m="http://schemas.openxmlformats.org/officeDocument/2006/math">
+                        <m:oMathParaPr>
+                          <m:jc m:val="centerGroup"/>
+                        </m:oMathParaPr>
+                        <m:oMath xmlns:m="http://schemas.openxmlformats.org/officeDocument/2006/math">
+                          <m:r>
+                            <a:rPr lang="en-US" b="0" i="1" smtClean="0">
+                              <a:latin typeface="Cambria Math" panose="02040503050406030204" pitchFamily="18" charset="0"/>
+                            </a:rPr>
+                            <m:t>𝑢</m:t>
+                          </m:r>
+                          <m:r>
+                            <a:rPr lang="en-US" b="0" i="1" smtClean="0">
+                              <a:latin typeface="Cambria Math" panose="02040503050406030204" pitchFamily="18" charset="0"/>
+                            </a:rPr>
+                            <m:t>=</m:t>
+                          </m:r>
+                          <m:r>
+                            <a:rPr lang="en-US" b="0" i="1" smtClean="0">
+                              <a:latin typeface="Cambria Math" panose="02040503050406030204" pitchFamily="18" charset="0"/>
+                            </a:rPr>
+                            <m:t>6</m:t>
+                          </m:r>
+                        </m:oMath>
+                      </m:oMathPara>
+                    </a14:m>
+                    <a:endParaRPr lang="he-IL" dirty="0"/>
+                  </a:p>
+                </p:txBody>
+              </p:sp>
+            </mc:Choice>
+            <mc:Fallback>
+              <p:sp>
+                <p:nvSpPr>
+                  <p:cNvPr id="90" name="TextBox 89">
+                    <a:extLst>
+                      <a:ext uri="{FF2B5EF4-FFF2-40B4-BE49-F238E27FC236}">
+                        <a16:creationId xmlns:a16="http://schemas.microsoft.com/office/drawing/2014/main" id="{F8C9AD82-3C3A-494D-9BA4-A283AEE4C996}"/>
+                      </a:ext>
+                    </a:extLst>
+                  </p:cNvPr>
+                  <p:cNvSpPr txBox="1">
+                    <a:spLocks noRot="1" noChangeAspect="1" noMove="1" noResize="1" noEditPoints="1" noAdjustHandles="1" noChangeArrowheads="1" noChangeShapeType="1" noTextEdit="1"/>
+                  </p:cNvSpPr>
+                  <p:nvPr/>
+                </p:nvSpPr>
+                <p:spPr>
+                  <a:xfrm>
+                    <a:off x="6289926" y="4998721"/>
+                    <a:ext cx="1371600" cy="369332"/>
+                  </a:xfrm>
+                  <a:prstGeom prst="rect">
+                    <a:avLst/>
+                  </a:prstGeom>
+                  <a:blipFill>
+                    <a:blip r:embed="rId3"/>
+                    <a:stretch>
+                      <a:fillRect/>
+                    </a:stretch>
+                  </a:blipFill>
+                </p:spPr>
+                <p:txBody>
+                  <a:bodyPr/>
+                  <a:lstStyle/>
+                  <a:p>
+                    <a:r>
+                      <a:rPr lang="he-IL">
+                        <a:noFill/>
+                      </a:rPr>
+                      <a:t> </a:t>
+                    </a:r>
+                  </a:p>
+                </p:txBody>
+              </p:sp>
+            </mc:Fallback>
+          </mc:AlternateContent>
+          <p:sp>
+            <p:nvSpPr>
+              <p:cNvPr id="97" name="TextBox 96">
+                <a:extLst>
+                  <a:ext uri="{FF2B5EF4-FFF2-40B4-BE49-F238E27FC236}">
+                    <a16:creationId xmlns:a16="http://schemas.microsoft.com/office/drawing/2014/main" id="{0BB38F54-C0AC-4223-864C-75126843B2C2}"/>
+                  </a:ext>
+                </a:extLst>
+              </p:cNvPr>
+              <p:cNvSpPr txBox="1"/>
+              <p:nvPr/>
+            </p:nvSpPr>
+            <p:spPr>
+              <a:xfrm>
+                <a:off x="6825488" y="3161334"/>
+                <a:ext cx="300477" cy="369332"/>
+              </a:xfrm>
+              <a:prstGeom prst="rect">
+                <a:avLst/>
+              </a:prstGeom>
+              <a:noFill/>
+            </p:spPr>
+            <p:txBody>
+              <a:bodyPr wrap="square" rtlCol="1">
+                <a:spAutoFit/>
+              </a:bodyPr>
+              <a:lstStyle/>
+              <a:p>
+                <a:r>
+                  <a:rPr lang="en-US" b="0" dirty="0">
+                    <a:latin typeface="David" panose="020E0502060401010101" pitchFamily="34" charset="-79"/>
+                    <a:cs typeface="David" panose="020E0502060401010101" pitchFamily="34" charset="-79"/>
+                  </a:rPr>
+                  <a:t>6</a:t>
+                </a:r>
+              </a:p>
+            </p:txBody>
+          </p:sp>
+          <mc:AlternateContent xmlns:mc="http://schemas.openxmlformats.org/markup-compatibility/2006">
+            <mc:Choice xmlns:a14="http://schemas.microsoft.com/office/drawing/2010/main" Requires="a14">
+              <p:sp>
+                <p:nvSpPr>
+                  <p:cNvPr id="105" name="TextBox 104">
+                    <a:extLst>
+                      <a:ext uri="{FF2B5EF4-FFF2-40B4-BE49-F238E27FC236}">
+                        <a16:creationId xmlns:a16="http://schemas.microsoft.com/office/drawing/2014/main" id="{9577912A-E62C-4FD9-8B07-19FD3427E08D}"/>
+                      </a:ext>
+                    </a:extLst>
+                  </p:cNvPr>
+                  <p:cNvSpPr txBox="1"/>
+                  <p:nvPr/>
+                </p:nvSpPr>
+                <p:spPr>
+                  <a:xfrm>
+                    <a:off x="7287885" y="2964050"/>
+                    <a:ext cx="1371600" cy="646331"/>
+                  </a:xfrm>
+                  <a:prstGeom prst="rect">
+                    <a:avLst/>
+                  </a:prstGeom>
+                  <a:noFill/>
+                </p:spPr>
+                <p:txBody>
+                  <a:bodyPr wrap="square" rtlCol="1">
+                    <a:spAutoFit/>
+                  </a:bodyPr>
+                  <a:lstStyle/>
+                  <a:p>
+                    <a:r>
+                      <a:rPr lang="en-US" b="0" dirty="0">
+                        <a:latin typeface="David" panose="020E0502060401010101" pitchFamily="34" charset="-79"/>
+                        <a:cs typeface="David" panose="020E0502060401010101" pitchFamily="34" charset="-79"/>
+                      </a:rPr>
+                      <a:t>Alpha:6</a:t>
+                    </a:r>
+                  </a:p>
+                  <a:p>
+                    <a:r>
+                      <a:rPr lang="en-US" dirty="0">
+                        <a:latin typeface="David" panose="020E0502060401010101" pitchFamily="34" charset="-79"/>
+                        <a:cs typeface="David" panose="020E0502060401010101" pitchFamily="34" charset="-79"/>
+                      </a:rPr>
+                      <a:t>Beta:</a:t>
+                    </a:r>
+                    <a14:m>
+                      <m:oMath xmlns:m="http://schemas.openxmlformats.org/officeDocument/2006/math">
+                        <m:r>
+                          <a:rPr lang="en-US" b="0" i="1" smtClean="0">
+                            <a:latin typeface="Cambria Math" panose="02040503050406030204" pitchFamily="18" charset="0"/>
+                            <a:cs typeface="David" panose="020E0502060401010101" pitchFamily="34" charset="-79"/>
+                          </a:rPr>
+                          <m:t>−</m:t>
+                        </m:r>
+                        <m:r>
+                          <a:rPr lang="en-US" b="0" i="1" smtClean="0">
+                            <a:latin typeface="Cambria Math" panose="02040503050406030204" pitchFamily="18" charset="0"/>
+                            <a:ea typeface="Cambria Math" panose="02040503050406030204" pitchFamily="18" charset="0"/>
+                            <a:cs typeface="David" panose="020E0502060401010101" pitchFamily="34" charset="-79"/>
+                          </a:rPr>
+                          <m:t>∞</m:t>
+                        </m:r>
+                      </m:oMath>
+                    </a14:m>
+                    <a:endParaRPr lang="en-US" b="0" dirty="0">
+                      <a:latin typeface="David" panose="020E0502060401010101" pitchFamily="34" charset="-79"/>
+                      <a:cs typeface="David" panose="020E0502060401010101" pitchFamily="34" charset="-79"/>
+                    </a:endParaRPr>
+                  </a:p>
+                </p:txBody>
+              </p:sp>
+            </mc:Choice>
+            <mc:Fallback>
+              <p:sp>
+                <p:nvSpPr>
+                  <p:cNvPr id="105" name="TextBox 104">
+                    <a:extLst>
+                      <a:ext uri="{FF2B5EF4-FFF2-40B4-BE49-F238E27FC236}">
+                        <a16:creationId xmlns:a16="http://schemas.microsoft.com/office/drawing/2014/main" id="{9577912A-E62C-4FD9-8B07-19FD3427E08D}"/>
+                      </a:ext>
+                    </a:extLst>
+                  </p:cNvPr>
+                  <p:cNvSpPr txBox="1">
+                    <a:spLocks noRot="1" noChangeAspect="1" noMove="1" noResize="1" noEditPoints="1" noAdjustHandles="1" noChangeArrowheads="1" noChangeShapeType="1" noTextEdit="1"/>
+                  </p:cNvSpPr>
+                  <p:nvPr/>
+                </p:nvSpPr>
+                <p:spPr>
+                  <a:xfrm>
+                    <a:off x="7287885" y="2964050"/>
+                    <a:ext cx="1371600" cy="646331"/>
+                  </a:xfrm>
+                  <a:prstGeom prst="rect">
+                    <a:avLst/>
+                  </a:prstGeom>
+                  <a:blipFill>
+                    <a:blip r:embed="rId4"/>
+                    <a:stretch>
+                      <a:fillRect l="-4000" t="-5660" b="-14151"/>
+                    </a:stretch>
+                  </a:blipFill>
+                </p:spPr>
+                <p:txBody>
+                  <a:bodyPr/>
+                  <a:lstStyle/>
+                  <a:p>
+                    <a:r>
+                      <a:rPr lang="he-IL">
+                        <a:noFill/>
+                      </a:rPr>
+                      <a:t> </a:t>
+                    </a:r>
+                  </a:p>
+                </p:txBody>
+              </p:sp>
+            </mc:Fallback>
+          </mc:AlternateContent>
+          <p:sp>
+            <p:nvSpPr>
+              <p:cNvPr id="106" name="TextBox 105">
+                <a:extLst>
+                  <a:ext uri="{FF2B5EF4-FFF2-40B4-BE49-F238E27FC236}">
+                    <a16:creationId xmlns:a16="http://schemas.microsoft.com/office/drawing/2014/main" id="{B32DC7FB-0B86-46F8-ABEC-B63D53BDBB4F}"/>
+                  </a:ext>
+                </a:extLst>
+              </p:cNvPr>
+              <p:cNvSpPr txBox="1"/>
+              <p:nvPr/>
+            </p:nvSpPr>
+            <p:spPr>
+              <a:xfrm>
+                <a:off x="3416995" y="1857706"/>
+                <a:ext cx="1371600" cy="369332"/>
+              </a:xfrm>
+              <a:prstGeom prst="rect">
+                <a:avLst/>
+              </a:prstGeom>
+              <a:noFill/>
+            </p:spPr>
+            <p:txBody>
+              <a:bodyPr wrap="square" rtlCol="1">
+                <a:spAutoFit/>
+              </a:bodyPr>
+              <a:lstStyle/>
+              <a:p>
+                <a:r>
+                  <a:rPr lang="en-US" b="0" dirty="0">
+                    <a:latin typeface="David" panose="020E0502060401010101" pitchFamily="34" charset="-79"/>
+                    <a:cs typeface="David" panose="020E0502060401010101" pitchFamily="34" charset="-79"/>
+                  </a:rPr>
+                  <a:t>…</a:t>
+                </a:r>
+              </a:p>
+            </p:txBody>
+          </p:sp>
+          <mc:AlternateContent xmlns:mc="http://schemas.openxmlformats.org/markup-compatibility/2006">
+            <mc:Choice xmlns:a14="http://schemas.microsoft.com/office/drawing/2010/main" Requires="a14">
+              <p:sp>
+                <p:nvSpPr>
+                  <p:cNvPr id="109" name="TextBox 108">
+                    <a:extLst>
+                      <a:ext uri="{FF2B5EF4-FFF2-40B4-BE49-F238E27FC236}">
+                        <a16:creationId xmlns:a16="http://schemas.microsoft.com/office/drawing/2014/main" id="{5CA7155C-48CF-42C7-9AAF-F044A0EAC69B}"/>
+                      </a:ext>
+                    </a:extLst>
+                  </p:cNvPr>
+                  <p:cNvSpPr txBox="1"/>
+                  <p:nvPr/>
+                </p:nvSpPr>
+                <p:spPr>
+                  <a:xfrm>
+                    <a:off x="7456101" y="2028444"/>
+                    <a:ext cx="1371600" cy="369332"/>
+                  </a:xfrm>
+                  <a:prstGeom prst="rect">
+                    <a:avLst/>
+                  </a:prstGeom>
+                  <a:noFill/>
+                </p:spPr>
+                <p:txBody>
+                  <a:bodyPr wrap="square" rtlCol="1">
+                    <a:spAutoFit/>
+                  </a:bodyPr>
+                  <a:lstStyle/>
+                  <a:p>
+                    <a14:m>
+                      <m:oMathPara xmlns:m="http://schemas.openxmlformats.org/officeDocument/2006/math">
+                        <m:oMathParaPr>
+                          <m:jc m:val="centerGroup"/>
+                        </m:oMathParaPr>
+                        <m:oMath xmlns:m="http://schemas.openxmlformats.org/officeDocument/2006/math">
+                          <m:r>
+                            <a:rPr lang="en-US" b="0" i="1" dirty="0" smtClean="0">
+                              <a:latin typeface="Cambria Math" panose="02040503050406030204" pitchFamily="18" charset="0"/>
+                              <a:cs typeface="David" panose="020E0502060401010101" pitchFamily="34" charset="-79"/>
+                            </a:rPr>
+                            <m:t>−</m:t>
+                          </m:r>
+                          <m:r>
+                            <a:rPr lang="en-US" b="0" i="1" dirty="0" smtClean="0">
+                              <a:latin typeface="Cambria Math" panose="02040503050406030204" pitchFamily="18" charset="0"/>
+                              <a:ea typeface="Cambria Math" panose="02040503050406030204" pitchFamily="18" charset="0"/>
+                              <a:cs typeface="David" panose="020E0502060401010101" pitchFamily="34" charset="-79"/>
+                            </a:rPr>
+                            <m:t>∞</m:t>
+                          </m:r>
+                        </m:oMath>
+                      </m:oMathPara>
+                    </a14:m>
+                    <a:endParaRPr lang="en-US" b="0" dirty="0">
+                      <a:latin typeface="David" panose="020E0502060401010101" pitchFamily="34" charset="-79"/>
+                      <a:cs typeface="David" panose="020E0502060401010101" pitchFamily="34" charset="-79"/>
+                    </a:endParaRPr>
+                  </a:p>
+                </p:txBody>
+              </p:sp>
+            </mc:Choice>
+            <mc:Fallback>
+              <p:sp>
+                <p:nvSpPr>
+                  <p:cNvPr id="109" name="TextBox 108">
+                    <a:extLst>
+                      <a:ext uri="{FF2B5EF4-FFF2-40B4-BE49-F238E27FC236}">
+                        <a16:creationId xmlns:a16="http://schemas.microsoft.com/office/drawing/2014/main" id="{5CA7155C-48CF-42C7-9AAF-F044A0EAC69B}"/>
+                      </a:ext>
+                    </a:extLst>
+                  </p:cNvPr>
+                  <p:cNvSpPr txBox="1">
+                    <a:spLocks noRot="1" noChangeAspect="1" noMove="1" noResize="1" noEditPoints="1" noAdjustHandles="1" noChangeArrowheads="1" noChangeShapeType="1" noTextEdit="1"/>
+                  </p:cNvSpPr>
+                  <p:nvPr/>
+                </p:nvSpPr>
+                <p:spPr>
+                  <a:xfrm>
+                    <a:off x="7456101" y="2028444"/>
+                    <a:ext cx="1371600" cy="369332"/>
+                  </a:xfrm>
+                  <a:prstGeom prst="rect">
+                    <a:avLst/>
+                  </a:prstGeom>
+                  <a:blipFill>
+                    <a:blip r:embed="rId5"/>
+                    <a:stretch>
+                      <a:fillRect/>
+                    </a:stretch>
+                  </a:blipFill>
+                </p:spPr>
+                <p:txBody>
+                  <a:bodyPr/>
+                  <a:lstStyle/>
+                  <a:p>
+                    <a:r>
+                      <a:rPr lang="he-IL">
+                        <a:noFill/>
+                      </a:rPr>
+                      <a:t> </a:t>
+                    </a:r>
+                  </a:p>
+                </p:txBody>
+              </p:sp>
+            </mc:Fallback>
+          </mc:AlternateContent>
+          <mc:AlternateContent xmlns:mc="http://schemas.openxmlformats.org/markup-compatibility/2006">
+            <mc:Choice xmlns:a14="http://schemas.microsoft.com/office/drawing/2010/main" Requires="a14">
+              <p:sp>
+                <p:nvSpPr>
+                  <p:cNvPr id="110" name="TextBox 109">
+                    <a:extLst>
+                      <a:ext uri="{FF2B5EF4-FFF2-40B4-BE49-F238E27FC236}">
+                        <a16:creationId xmlns:a16="http://schemas.microsoft.com/office/drawing/2014/main" id="{CD47B061-7C94-47D6-B1F2-C71F5C08D5C4}"/>
+                      </a:ext>
+                    </a:extLst>
+                  </p:cNvPr>
+                  <p:cNvSpPr txBox="1"/>
+                  <p:nvPr/>
+                </p:nvSpPr>
+                <p:spPr>
+                  <a:xfrm>
+                    <a:off x="2820647" y="2412628"/>
+                    <a:ext cx="1371600" cy="369332"/>
+                  </a:xfrm>
+                  <a:prstGeom prst="rect">
+                    <a:avLst/>
+                  </a:prstGeom>
+                  <a:noFill/>
+                </p:spPr>
+                <p:txBody>
+                  <a:bodyPr wrap="square" rtlCol="1">
+                    <a:spAutoFit/>
+                  </a:bodyPr>
+                  <a:lstStyle/>
+                  <a:p>
+                    <a:pPr/>
+                    <a14:m>
+                      <m:oMathPara xmlns:m="http://schemas.openxmlformats.org/officeDocument/2006/math">
+                        <m:oMathParaPr>
+                          <m:jc m:val="centerGroup"/>
+                        </m:oMathParaPr>
+                        <m:oMath xmlns:m="http://schemas.openxmlformats.org/officeDocument/2006/math">
+                          <m:r>
+                            <a:rPr lang="en-US" b="0" i="1" smtClean="0">
+                              <a:latin typeface="Cambria Math" panose="02040503050406030204" pitchFamily="18" charset="0"/>
+                            </a:rPr>
+                            <m:t>h</m:t>
+                          </m:r>
+                          <m:r>
+                            <a:rPr lang="en-US" b="0" i="1" smtClean="0">
+                              <a:latin typeface="Cambria Math" panose="02040503050406030204" pitchFamily="18" charset="0"/>
+                            </a:rPr>
+                            <m:t>=</m:t>
+                          </m:r>
+                          <m:r>
+                            <a:rPr lang="en-US" b="0" i="1" smtClean="0">
+                              <a:latin typeface="Cambria Math" panose="02040503050406030204" pitchFamily="18" charset="0"/>
+                            </a:rPr>
+                            <m:t>6</m:t>
+                          </m:r>
+                        </m:oMath>
+                      </m:oMathPara>
+                    </a14:m>
+                    <a:endParaRPr lang="he-IL" dirty="0"/>
+                  </a:p>
+                </p:txBody>
+              </p:sp>
+            </mc:Choice>
+            <mc:Fallback>
+              <p:sp>
+                <p:nvSpPr>
+                  <p:cNvPr id="110" name="TextBox 109">
+                    <a:extLst>
+                      <a:ext uri="{FF2B5EF4-FFF2-40B4-BE49-F238E27FC236}">
+                        <a16:creationId xmlns:a16="http://schemas.microsoft.com/office/drawing/2014/main" id="{CD47B061-7C94-47D6-B1F2-C71F5C08D5C4}"/>
+                      </a:ext>
+                    </a:extLst>
+                  </p:cNvPr>
+                  <p:cNvSpPr txBox="1">
+                    <a:spLocks noRot="1" noChangeAspect="1" noMove="1" noResize="1" noEditPoints="1" noAdjustHandles="1" noChangeArrowheads="1" noChangeShapeType="1" noTextEdit="1"/>
+                  </p:cNvSpPr>
+                  <p:nvPr/>
+                </p:nvSpPr>
+                <p:spPr>
+                  <a:xfrm>
+                    <a:off x="2820647" y="2412628"/>
+                    <a:ext cx="1371600" cy="369332"/>
+                  </a:xfrm>
+                  <a:prstGeom prst="rect">
+                    <a:avLst/>
+                  </a:prstGeom>
+                  <a:blipFill>
+                    <a:blip r:embed="rId6"/>
+                    <a:stretch>
+                      <a:fillRect/>
+                    </a:stretch>
+                  </a:blipFill>
+                </p:spPr>
+                <p:txBody>
+                  <a:bodyPr/>
+                  <a:lstStyle/>
+                  <a:p>
+                    <a:r>
+                      <a:rPr lang="he-IL">
+                        <a:noFill/>
+                      </a:rPr>
+                      <a:t> </a:t>
+                    </a:r>
+                  </a:p>
+                </p:txBody>
+              </p:sp>
+            </mc:Fallback>
+          </mc:AlternateContent>
+        </p:grpSp>
+        <p:sp>
+          <p:nvSpPr>
+            <p:cNvPr id="112" name="TextBox 111">
+              <a:extLst>
+                <a:ext uri="{FF2B5EF4-FFF2-40B4-BE49-F238E27FC236}">
+                  <a16:creationId xmlns:a16="http://schemas.microsoft.com/office/drawing/2014/main" id="{03ED49A3-F12D-48B1-AA46-D34A55DB13AD}"/>
+                </a:ext>
+              </a:extLst>
+            </p:cNvPr>
+            <p:cNvSpPr txBox="1"/>
+            <p:nvPr/>
+          </p:nvSpPr>
+          <p:spPr>
+            <a:xfrm>
+              <a:off x="7732254" y="3260375"/>
+              <a:ext cx="1371600" cy="369332"/>
+            </a:xfrm>
+            <a:prstGeom prst="rect">
+              <a:avLst/>
+            </a:prstGeom>
+            <a:noFill/>
+          </p:spPr>
+          <p:txBody>
+            <a:bodyPr wrap="square" rtlCol="1">
+              <a:spAutoFit/>
+            </a:bodyPr>
+            <a:lstStyle/>
+            <a:p>
+              <a:r>
+                <a:rPr lang="en-US" b="0" dirty="0">
+                  <a:latin typeface="David" panose="020E0502060401010101" pitchFamily="34" charset="-79"/>
+                  <a:cs typeface="David" panose="020E0502060401010101" pitchFamily="34" charset="-79"/>
+                </a:rPr>
+                <a:t>…</a:t>
+              </a:r>
+            </a:p>
+          </p:txBody>
+        </p:sp>
+      </p:grpSp>
+    </p:spTree>
+    <p:extLst>
+      <p:ext uri="{BB962C8B-B14F-4D97-AF65-F5344CB8AC3E}">
+        <p14:creationId xmlns:p14="http://schemas.microsoft.com/office/powerpoint/2010/main" val="3692877893"/>
       </p:ext>
     </p:extLst>
   </p:cSld>

</xml_diff>